<commit_message>
Dodano prezentację o hasłach
</commit_message>
<xml_diff>
--- a/Programowanie/C++/Zmienne.pptx
+++ b/Programowanie/C++/Zmienne.pptx
@@ -8,15 +8,16 @@
     <p:sldId id="256" r:id="rId2"/>
     <p:sldId id="257" r:id="rId3"/>
     <p:sldId id="258" r:id="rId4"/>
-    <p:sldId id="259" r:id="rId5"/>
-    <p:sldId id="260" r:id="rId6"/>
-    <p:sldId id="261" r:id="rId7"/>
-    <p:sldId id="262" r:id="rId8"/>
-    <p:sldId id="263" r:id="rId9"/>
-    <p:sldId id="264" r:id="rId10"/>
-    <p:sldId id="265" r:id="rId11"/>
-    <p:sldId id="266" r:id="rId12"/>
-    <p:sldId id="267" r:id="rId13"/>
+    <p:sldId id="268" r:id="rId5"/>
+    <p:sldId id="269" r:id="rId6"/>
+    <p:sldId id="270" r:id="rId7"/>
+    <p:sldId id="261" r:id="rId8"/>
+    <p:sldId id="262" r:id="rId9"/>
+    <p:sldId id="263" r:id="rId10"/>
+    <p:sldId id="264" r:id="rId11"/>
+    <p:sldId id="265" r:id="rId12"/>
+    <p:sldId id="266" r:id="rId13"/>
+    <p:sldId id="267" r:id="rId14"/>
   </p:sldIdLst>
   <p:sldSz cx="12192000" cy="6858000"/>
   <p:notesSz cx="6858000" cy="9144000"/>
@@ -252,7 +253,7 @@
           <a:p>
             <a:fld id="{864D855C-A84D-D148-8ABE-6F03B1DFA2B0}" type="datetimeFigureOut">
               <a:rPr lang="pl-PL" smtClean="0"/>
-              <a:t>13.05.2018</a:t>
+              <a:t>16.06.2018</a:t>
             </a:fld>
             <a:endParaRPr lang="pl-PL"/>
           </a:p>
@@ -420,7 +421,7 @@
           <a:p>
             <a:fld id="{864D855C-A84D-D148-8ABE-6F03B1DFA2B0}" type="datetimeFigureOut">
               <a:rPr lang="pl-PL" smtClean="0"/>
-              <a:t>13.05.2018</a:t>
+              <a:t>16.06.2018</a:t>
             </a:fld>
             <a:endParaRPr lang="pl-PL"/>
           </a:p>
@@ -598,7 +599,7 @@
           <a:p>
             <a:fld id="{864D855C-A84D-D148-8ABE-6F03B1DFA2B0}" type="datetimeFigureOut">
               <a:rPr lang="pl-PL" smtClean="0"/>
-              <a:t>13.05.2018</a:t>
+              <a:t>16.06.2018</a:t>
             </a:fld>
             <a:endParaRPr lang="pl-PL"/>
           </a:p>
@@ -766,7 +767,7 @@
           <a:p>
             <a:fld id="{864D855C-A84D-D148-8ABE-6F03B1DFA2B0}" type="datetimeFigureOut">
               <a:rPr lang="pl-PL" smtClean="0"/>
-              <a:t>13.05.2018</a:t>
+              <a:t>16.06.2018</a:t>
             </a:fld>
             <a:endParaRPr lang="pl-PL"/>
           </a:p>
@@ -1011,7 +1012,7 @@
           <a:p>
             <a:fld id="{864D855C-A84D-D148-8ABE-6F03B1DFA2B0}" type="datetimeFigureOut">
               <a:rPr lang="pl-PL" smtClean="0"/>
-              <a:t>13.05.2018</a:t>
+              <a:t>16.06.2018</a:t>
             </a:fld>
             <a:endParaRPr lang="pl-PL"/>
           </a:p>
@@ -1240,7 +1241,7 @@
           <a:p>
             <a:fld id="{864D855C-A84D-D148-8ABE-6F03B1DFA2B0}" type="datetimeFigureOut">
               <a:rPr lang="pl-PL" smtClean="0"/>
-              <a:t>13.05.2018</a:t>
+              <a:t>16.06.2018</a:t>
             </a:fld>
             <a:endParaRPr lang="pl-PL"/>
           </a:p>
@@ -1604,7 +1605,7 @@
           <a:p>
             <a:fld id="{864D855C-A84D-D148-8ABE-6F03B1DFA2B0}" type="datetimeFigureOut">
               <a:rPr lang="pl-PL" smtClean="0"/>
-              <a:t>13.05.2018</a:t>
+              <a:t>16.06.2018</a:t>
             </a:fld>
             <a:endParaRPr lang="pl-PL"/>
           </a:p>
@@ -1721,7 +1722,7 @@
           <a:p>
             <a:fld id="{864D855C-A84D-D148-8ABE-6F03B1DFA2B0}" type="datetimeFigureOut">
               <a:rPr lang="pl-PL" smtClean="0"/>
-              <a:t>13.05.2018</a:t>
+              <a:t>16.06.2018</a:t>
             </a:fld>
             <a:endParaRPr lang="pl-PL"/>
           </a:p>
@@ -1816,7 +1817,7 @@
           <a:p>
             <a:fld id="{864D855C-A84D-D148-8ABE-6F03B1DFA2B0}" type="datetimeFigureOut">
               <a:rPr lang="pl-PL" smtClean="0"/>
-              <a:t>13.05.2018</a:t>
+              <a:t>16.06.2018</a:t>
             </a:fld>
             <a:endParaRPr lang="pl-PL"/>
           </a:p>
@@ -2091,7 +2092,7 @@
           <a:p>
             <a:fld id="{864D855C-A84D-D148-8ABE-6F03B1DFA2B0}" type="datetimeFigureOut">
               <a:rPr lang="pl-PL" smtClean="0"/>
-              <a:t>13.05.2018</a:t>
+              <a:t>16.06.2018</a:t>
             </a:fld>
             <a:endParaRPr lang="pl-PL"/>
           </a:p>
@@ -2343,7 +2344,7 @@
           <a:p>
             <a:fld id="{864D855C-A84D-D148-8ABE-6F03B1DFA2B0}" type="datetimeFigureOut">
               <a:rPr lang="pl-PL" smtClean="0"/>
-              <a:t>13.05.2018</a:t>
+              <a:t>16.06.2018</a:t>
             </a:fld>
             <a:endParaRPr lang="pl-PL"/>
           </a:p>
@@ -2554,7 +2555,7 @@
           <a:p>
             <a:fld id="{864D855C-A84D-D148-8ABE-6F03B1DFA2B0}" type="datetimeFigureOut">
               <a:rPr lang="pl-PL" smtClean="0"/>
-              <a:t>13.05.2018</a:t>
+              <a:t>16.06.2018</a:t>
             </a:fld>
             <a:endParaRPr lang="pl-PL"/>
           </a:p>
@@ -3050,7 +3051,7 @@
           <a:p>
             <a:r>
               <a:rPr lang="pl-PL" dirty="0"/>
-              <a:t>Nazywanie zmiennych</a:t>
+              <a:t>Tworzenie zmiennych</a:t>
             </a:r>
           </a:p>
         </p:txBody>
@@ -3072,33 +3073,31 @@
           <a:p>
             <a:r>
               <a:rPr lang="pl-PL" dirty="0"/>
-              <a:t>Nazwa nie może zawierać polskich liter. </a:t>
+              <a:t>Aby wykorzystać zmienną w programie, musimy ją najpierw utworzyć</a:t>
             </a:r>
           </a:p>
           <a:p>
             <a:r>
               <a:rPr lang="pl-PL" dirty="0"/>
-              <a:t>Nazwa może zawierać wyłącznie litery, liczby i </a:t>
-            </a:r>
-            <a:r>
-              <a:rPr lang="pl-PL" dirty="0" err="1"/>
-              <a:t>podkreślnik</a:t>
-            </a:r>
+              <a:t>Robimy to w następujący sposób:</a:t>
+            </a:r>
+          </a:p>
+          <a:p>
+            <a:pPr marL="0" indent="0" algn="ctr">
+              <a:buNone/>
+            </a:pPr>
+            <a:r>
+              <a:rPr lang="pl-PL" dirty="0">
+                <a:latin typeface="Consolas" panose="020B0609020204030204" pitchFamily="49" charset="0"/>
+                <a:cs typeface="Consolas" panose="020B0609020204030204" pitchFamily="49" charset="0"/>
+              </a:rPr>
+              <a:t>typ nazwa;</a:t>
+            </a:r>
+          </a:p>
+          <a:p>
             <a:r>
               <a:rPr lang="pl-PL" dirty="0"/>
-              <a:t>.</a:t>
-            </a:r>
-          </a:p>
-          <a:p>
-            <a:r>
-              <a:rPr lang="pl-PL" dirty="0"/>
-              <a:t>Nazwa powinna zaczynać się z małej litery.</a:t>
-            </a:r>
-          </a:p>
-          <a:p>
-            <a:r>
-              <a:rPr lang="pl-PL" dirty="0"/>
-              <a:t>Jeżeli nazwa składa się z kilku wyrazów, to każdy kolejny (oprócz pierwszego) powinien zaczynać się z wielkiej litery, np.:</a:t>
+              <a:t>Np.:</a:t>
             </a:r>
           </a:p>
           <a:p>
@@ -3117,29 +3116,20 @@
                 <a:latin typeface="Consolas" panose="020B0609020204030204" pitchFamily="49" charset="0"/>
                 <a:cs typeface="Consolas" panose="020B0609020204030204" pitchFamily="49" charset="0"/>
               </a:rPr>
-              <a:t> </a:t>
-            </a:r>
-            <a:r>
-              <a:rPr lang="pl-PL" dirty="0" err="1">
-                <a:latin typeface="Consolas" panose="020B0609020204030204" pitchFamily="49" charset="0"/>
-                <a:cs typeface="Consolas" panose="020B0609020204030204" pitchFamily="49" charset="0"/>
-              </a:rPr>
-              <a:t>punktyZyciaBohatera</a:t>
-            </a:r>
-            <a:r>
-              <a:rPr lang="pl-PL" dirty="0">
-                <a:latin typeface="Consolas" panose="020B0609020204030204" pitchFamily="49" charset="0"/>
-                <a:cs typeface="Consolas" panose="020B0609020204030204" pitchFamily="49" charset="0"/>
-              </a:rPr>
-              <a:t>;</a:t>
-            </a:r>
+              <a:t> x;</a:t>
+            </a:r>
+          </a:p>
+          <a:p>
+            <a:endParaRPr lang="pl-PL" dirty="0">
+              <a:cs typeface="Consolas" panose="020B0609020204030204" pitchFamily="49" charset="0"/>
+            </a:endParaRPr>
           </a:p>
         </p:txBody>
       </p:sp>
     </p:spTree>
     <p:extLst>
       <p:ext uri="{BB962C8B-B14F-4D97-AF65-F5344CB8AC3E}">
-        <p14:creationId xmlns:p14="http://schemas.microsoft.com/office/powerpoint/2010/main" val="1385528022"/>
+        <p14:creationId xmlns:p14="http://schemas.microsoft.com/office/powerpoint/2010/main" val="128022028"/>
       </p:ext>
     </p:extLst>
   </p:cSld>
@@ -3183,6 +3173,139 @@
           <a:p>
             <a:r>
               <a:rPr lang="pl-PL" dirty="0"/>
+              <a:t>Nazywanie zmiennych</a:t>
+            </a:r>
+          </a:p>
+        </p:txBody>
+      </p:sp>
+      <p:sp>
+        <p:nvSpPr>
+          <p:cNvPr id="3" name="Symbol zastępczy zawartości 2"/>
+          <p:cNvSpPr>
+            <a:spLocks noGrp="1"/>
+          </p:cNvSpPr>
+          <p:nvPr>
+            <p:ph idx="1"/>
+          </p:nvPr>
+        </p:nvSpPr>
+        <p:spPr/>
+        <p:txBody>
+          <a:bodyPr/>
+          <a:lstStyle/>
+          <a:p>
+            <a:r>
+              <a:rPr lang="pl-PL" dirty="0"/>
+              <a:t>Nazwa nie może zawierać polskich liter. </a:t>
+            </a:r>
+          </a:p>
+          <a:p>
+            <a:r>
+              <a:rPr lang="pl-PL" dirty="0"/>
+              <a:t>Nazwa może zawierać wyłącznie litery, liczby i </a:t>
+            </a:r>
+            <a:r>
+              <a:rPr lang="pl-PL" dirty="0" err="1"/>
+              <a:t>podkreślnik</a:t>
+            </a:r>
+            <a:r>
+              <a:rPr lang="pl-PL" dirty="0"/>
+              <a:t>.</a:t>
+            </a:r>
+          </a:p>
+          <a:p>
+            <a:r>
+              <a:rPr lang="pl-PL" dirty="0"/>
+              <a:t>Nazwa powinna zaczynać się z małej litery.</a:t>
+            </a:r>
+          </a:p>
+          <a:p>
+            <a:r>
+              <a:rPr lang="pl-PL" dirty="0"/>
+              <a:t>Jeżeli nazwa składa się z kilku wyrazów, to każdy kolejny (oprócz pierwszego) powinien zaczynać się z wielkiej litery, np.:</a:t>
+            </a:r>
+          </a:p>
+          <a:p>
+            <a:pPr marL="0" indent="0" algn="ctr">
+              <a:buNone/>
+            </a:pPr>
+            <a:r>
+              <a:rPr lang="pl-PL" dirty="0" err="1">
+                <a:latin typeface="Consolas" panose="020B0609020204030204" pitchFamily="49" charset="0"/>
+                <a:cs typeface="Consolas" panose="020B0609020204030204" pitchFamily="49" charset="0"/>
+              </a:rPr>
+              <a:t>int</a:t>
+            </a:r>
+            <a:r>
+              <a:rPr lang="pl-PL" dirty="0">
+                <a:latin typeface="Consolas" panose="020B0609020204030204" pitchFamily="49" charset="0"/>
+                <a:cs typeface="Consolas" panose="020B0609020204030204" pitchFamily="49" charset="0"/>
+              </a:rPr>
+              <a:t> </a:t>
+            </a:r>
+            <a:r>
+              <a:rPr lang="pl-PL" dirty="0" err="1">
+                <a:latin typeface="Consolas" panose="020B0609020204030204" pitchFamily="49" charset="0"/>
+                <a:cs typeface="Consolas" panose="020B0609020204030204" pitchFamily="49" charset="0"/>
+              </a:rPr>
+              <a:t>punktyZyciaBohatera</a:t>
+            </a:r>
+            <a:r>
+              <a:rPr lang="pl-PL" dirty="0">
+                <a:latin typeface="Consolas" panose="020B0609020204030204" pitchFamily="49" charset="0"/>
+                <a:cs typeface="Consolas" panose="020B0609020204030204" pitchFamily="49" charset="0"/>
+              </a:rPr>
+              <a:t>;</a:t>
+            </a:r>
+          </a:p>
+        </p:txBody>
+      </p:sp>
+    </p:spTree>
+    <p:extLst>
+      <p:ext uri="{BB962C8B-B14F-4D97-AF65-F5344CB8AC3E}">
+        <p14:creationId xmlns:p14="http://schemas.microsoft.com/office/powerpoint/2010/main" val="1385528022"/>
+      </p:ext>
+    </p:extLst>
+  </p:cSld>
+  <p:clrMapOvr>
+    <a:masterClrMapping/>
+  </p:clrMapOvr>
+</p:sld>
+</file>
+
+<file path=ppt/slides/slide12.xml><?xml version="1.0" encoding="utf-8"?>
+<p:sld xmlns:a="http://schemas.openxmlformats.org/drawingml/2006/main" xmlns:r="http://schemas.openxmlformats.org/officeDocument/2006/relationships" xmlns:p="http://schemas.openxmlformats.org/presentationml/2006/main">
+  <p:cSld>
+    <p:spTree>
+      <p:nvGrpSpPr>
+        <p:cNvPr id="1" name=""/>
+        <p:cNvGrpSpPr/>
+        <p:nvPr/>
+      </p:nvGrpSpPr>
+      <p:grpSpPr>
+        <a:xfrm>
+          <a:off x="0" y="0"/>
+          <a:ext cx="0" cy="0"/>
+          <a:chOff x="0" y="0"/>
+          <a:chExt cx="0" cy="0"/>
+        </a:xfrm>
+      </p:grpSpPr>
+      <p:sp>
+        <p:nvSpPr>
+          <p:cNvPr id="2" name="Tytuł 1"/>
+          <p:cNvSpPr>
+            <a:spLocks noGrp="1"/>
+          </p:cNvSpPr>
+          <p:nvPr>
+            <p:ph type="title"/>
+          </p:nvPr>
+        </p:nvSpPr>
+        <p:spPr/>
+        <p:txBody>
+          <a:bodyPr/>
+          <a:lstStyle/>
+          <a:p>
+            <a:r>
+              <a:rPr lang="pl-PL" dirty="0"/>
               <a:t>Przypisywanie wartości</a:t>
             </a:r>
           </a:p>
@@ -3260,7 +3383,7 @@
 </p:sld>
 </file>
 
-<file path=ppt/slides/slide12.xml><?xml version="1.0" encoding="utf-8"?>
+<file path=ppt/slides/slide13.xml><?xml version="1.0" encoding="utf-8"?>
 <p:sld xmlns:a="http://schemas.openxmlformats.org/drawingml/2006/main" xmlns:r="http://schemas.openxmlformats.org/officeDocument/2006/relationships" xmlns:p="http://schemas.openxmlformats.org/presentationml/2006/main">
   <p:cSld>
     <p:spTree>
@@ -3702,7 +3825,13 @@
       </p:grpSpPr>
       <p:sp>
         <p:nvSpPr>
-          <p:cNvPr id="2" name="Tytuł 1"/>
+          <p:cNvPr id="2" name="Tytuł 1">
+            <a:extLst>
+              <a:ext uri="{FF2B5EF4-FFF2-40B4-BE49-F238E27FC236}">
+                <a16:creationId xmlns:a16="http://schemas.microsoft.com/office/drawing/2014/main" id="{6F7C3808-E292-9F4D-A773-6AC20AFE8843}"/>
+              </a:ext>
+            </a:extLst>
+          </p:cNvPr>
           <p:cNvSpPr>
             <a:spLocks noGrp="1"/>
           </p:cNvSpPr>
@@ -3717,14 +3846,20 @@
           <a:p>
             <a:r>
               <a:rPr lang="pl-PL" dirty="0"/>
-              <a:t>Liczby całkowite</a:t>
-            </a:r>
-          </a:p>
-        </p:txBody>
-      </p:sp>
-      <p:sp>
-        <p:nvSpPr>
-          <p:cNvPr id="3" name="Symbol zastępczy zawartości 2"/>
+              <a:t>Zakresy danych</a:t>
+            </a:r>
+          </a:p>
+        </p:txBody>
+      </p:sp>
+      <p:sp>
+        <p:nvSpPr>
+          <p:cNvPr id="3" name="Symbol zastępczy zawartości 2">
+            <a:extLst>
+              <a:ext uri="{FF2B5EF4-FFF2-40B4-BE49-F238E27FC236}">
+                <a16:creationId xmlns:a16="http://schemas.microsoft.com/office/drawing/2014/main" id="{BAD64F6F-3472-A449-94A4-3919875ABC46}"/>
+              </a:ext>
+            </a:extLst>
+          </p:cNvPr>
           <p:cNvSpPr>
             <a:spLocks noGrp="1"/>
           </p:cNvSpPr>
@@ -3738,254 +3873,22 @@
           <a:lstStyle/>
           <a:p>
             <a:r>
-              <a:rPr lang="pl-PL" dirty="0" err="1">
-                <a:latin typeface="Consolas" panose="020B0609020204030204" pitchFamily="49" charset="0"/>
-                <a:cs typeface="Consolas" panose="020B0609020204030204" pitchFamily="49" charset="0"/>
-              </a:rPr>
-              <a:t>int</a:t>
-            </a:r>
-            <a:endParaRPr lang="pl-PL" dirty="0">
-              <a:latin typeface="Consolas" panose="020B0609020204030204" pitchFamily="49" charset="0"/>
-              <a:cs typeface="Consolas" panose="020B0609020204030204" pitchFamily="49" charset="0"/>
-            </a:endParaRPr>
-          </a:p>
-          <a:p>
-            <a:r>
-              <a:rPr lang="pl-PL" dirty="0" err="1">
-                <a:latin typeface="Consolas" panose="020B0609020204030204" pitchFamily="49" charset="0"/>
-                <a:cs typeface="Consolas" panose="020B0609020204030204" pitchFamily="49" charset="0"/>
-              </a:rPr>
-              <a:t>unsigned</a:t>
-            </a:r>
-            <a:r>
-              <a:rPr lang="pl-PL" dirty="0">
-                <a:latin typeface="Consolas" panose="020B0609020204030204" pitchFamily="49" charset="0"/>
-                <a:cs typeface="Consolas" panose="020B0609020204030204" pitchFamily="49" charset="0"/>
-              </a:rPr>
-              <a:t> </a:t>
-            </a:r>
-            <a:r>
-              <a:rPr lang="pl-PL" dirty="0" err="1">
-                <a:latin typeface="Consolas" panose="020B0609020204030204" pitchFamily="49" charset="0"/>
-                <a:cs typeface="Consolas" panose="020B0609020204030204" pitchFamily="49" charset="0"/>
-              </a:rPr>
-              <a:t>int</a:t>
-            </a:r>
-            <a:endParaRPr lang="pl-PL" dirty="0">
-              <a:latin typeface="Consolas" panose="020B0609020204030204" pitchFamily="49" charset="0"/>
-              <a:cs typeface="Consolas" panose="020B0609020204030204" pitchFamily="49" charset="0"/>
-            </a:endParaRPr>
-          </a:p>
-          <a:p>
-            <a:r>
-              <a:rPr lang="pl-PL" dirty="0" err="1">
-                <a:latin typeface="Consolas" panose="020B0609020204030204" pitchFamily="49" charset="0"/>
-                <a:cs typeface="Consolas" panose="020B0609020204030204" pitchFamily="49" charset="0"/>
-              </a:rPr>
-              <a:t>long</a:t>
-            </a:r>
-            <a:r>
-              <a:rPr lang="pl-PL" dirty="0">
-                <a:latin typeface="Consolas" panose="020B0609020204030204" pitchFamily="49" charset="0"/>
-                <a:cs typeface="Consolas" panose="020B0609020204030204" pitchFamily="49" charset="0"/>
-              </a:rPr>
-              <a:t> </a:t>
-            </a:r>
-            <a:r>
-              <a:rPr lang="pl-PL" dirty="0" err="1">
-                <a:latin typeface="Consolas" panose="020B0609020204030204" pitchFamily="49" charset="0"/>
-                <a:cs typeface="Consolas" panose="020B0609020204030204" pitchFamily="49" charset="0"/>
-              </a:rPr>
-              <a:t>int</a:t>
-            </a:r>
-            <a:endParaRPr lang="pl-PL" dirty="0">
-              <a:latin typeface="Consolas" panose="020B0609020204030204" pitchFamily="49" charset="0"/>
-              <a:cs typeface="Consolas" panose="020B0609020204030204" pitchFamily="49" charset="0"/>
-            </a:endParaRPr>
-          </a:p>
-          <a:p>
-            <a:r>
-              <a:rPr lang="pl-PL" dirty="0" err="1">
-                <a:latin typeface="Consolas" panose="020B0609020204030204" pitchFamily="49" charset="0"/>
-                <a:cs typeface="Consolas" panose="020B0609020204030204" pitchFamily="49" charset="0"/>
-              </a:rPr>
-              <a:t>unsigned</a:t>
-            </a:r>
-            <a:r>
-              <a:rPr lang="pl-PL" dirty="0">
-                <a:latin typeface="Consolas" panose="020B0609020204030204" pitchFamily="49" charset="0"/>
-                <a:cs typeface="Consolas" panose="020B0609020204030204" pitchFamily="49" charset="0"/>
-              </a:rPr>
-              <a:t> </a:t>
-            </a:r>
-            <a:r>
-              <a:rPr lang="pl-PL" dirty="0" err="1">
-                <a:latin typeface="Consolas" panose="020B0609020204030204" pitchFamily="49" charset="0"/>
-                <a:cs typeface="Consolas" panose="020B0609020204030204" pitchFamily="49" charset="0"/>
-              </a:rPr>
-              <a:t>long</a:t>
-            </a:r>
-            <a:r>
-              <a:rPr lang="pl-PL" dirty="0">
-                <a:latin typeface="Consolas" panose="020B0609020204030204" pitchFamily="49" charset="0"/>
-                <a:cs typeface="Consolas" panose="020B0609020204030204" pitchFamily="49" charset="0"/>
-              </a:rPr>
-              <a:t> </a:t>
-            </a:r>
-            <a:r>
-              <a:rPr lang="pl-PL" dirty="0" err="1">
-                <a:latin typeface="Consolas" panose="020B0609020204030204" pitchFamily="49" charset="0"/>
-                <a:cs typeface="Consolas" panose="020B0609020204030204" pitchFamily="49" charset="0"/>
-              </a:rPr>
-              <a:t>int</a:t>
-            </a:r>
-            <a:endParaRPr lang="pl-PL" dirty="0">
-              <a:latin typeface="Consolas" panose="020B0609020204030204" pitchFamily="49" charset="0"/>
-              <a:cs typeface="Consolas" panose="020B0609020204030204" pitchFamily="49" charset="0"/>
-            </a:endParaRPr>
-          </a:p>
-          <a:p>
-            <a:r>
-              <a:rPr lang="pl-PL" dirty="0" err="1">
-                <a:latin typeface="Consolas" panose="020B0609020204030204" pitchFamily="49" charset="0"/>
-                <a:cs typeface="Consolas" panose="020B0609020204030204" pitchFamily="49" charset="0"/>
-              </a:rPr>
-              <a:t>long</a:t>
-            </a:r>
-            <a:r>
-              <a:rPr lang="pl-PL" dirty="0">
-                <a:latin typeface="Consolas" panose="020B0609020204030204" pitchFamily="49" charset="0"/>
-                <a:cs typeface="Consolas" panose="020B0609020204030204" pitchFamily="49" charset="0"/>
-              </a:rPr>
-              <a:t> </a:t>
-            </a:r>
-            <a:r>
-              <a:rPr lang="pl-PL" dirty="0" err="1">
-                <a:latin typeface="Consolas" panose="020B0609020204030204" pitchFamily="49" charset="0"/>
-                <a:cs typeface="Consolas" panose="020B0609020204030204" pitchFamily="49" charset="0"/>
-              </a:rPr>
-              <a:t>long</a:t>
-            </a:r>
-            <a:r>
-              <a:rPr lang="pl-PL" dirty="0">
-                <a:latin typeface="Consolas" panose="020B0609020204030204" pitchFamily="49" charset="0"/>
-                <a:cs typeface="Consolas" panose="020B0609020204030204" pitchFamily="49" charset="0"/>
-              </a:rPr>
-              <a:t> </a:t>
-            </a:r>
-            <a:r>
-              <a:rPr lang="pl-PL" dirty="0" err="1">
-                <a:latin typeface="Consolas" panose="020B0609020204030204" pitchFamily="49" charset="0"/>
-                <a:cs typeface="Consolas" panose="020B0609020204030204" pitchFamily="49" charset="0"/>
-              </a:rPr>
-              <a:t>int</a:t>
-            </a:r>
-            <a:endParaRPr lang="pl-PL" dirty="0">
-              <a:latin typeface="Consolas" panose="020B0609020204030204" pitchFamily="49" charset="0"/>
-              <a:cs typeface="Consolas" panose="020B0609020204030204" pitchFamily="49" charset="0"/>
-            </a:endParaRPr>
-          </a:p>
-          <a:p>
-            <a:r>
-              <a:rPr lang="pl-PL" dirty="0" err="1">
-                <a:latin typeface="Consolas" panose="020B0609020204030204" pitchFamily="49" charset="0"/>
-                <a:cs typeface="Consolas" panose="020B0609020204030204" pitchFamily="49" charset="0"/>
-              </a:rPr>
-              <a:t>unsigned</a:t>
-            </a:r>
-            <a:r>
-              <a:rPr lang="pl-PL" dirty="0">
-                <a:latin typeface="Consolas" panose="020B0609020204030204" pitchFamily="49" charset="0"/>
-                <a:cs typeface="Consolas" panose="020B0609020204030204" pitchFamily="49" charset="0"/>
-              </a:rPr>
-              <a:t> </a:t>
-            </a:r>
-            <a:r>
-              <a:rPr lang="pl-PL" dirty="0" err="1">
-                <a:latin typeface="Consolas" panose="020B0609020204030204" pitchFamily="49" charset="0"/>
-                <a:cs typeface="Consolas" panose="020B0609020204030204" pitchFamily="49" charset="0"/>
-              </a:rPr>
-              <a:t>long</a:t>
-            </a:r>
-            <a:r>
-              <a:rPr lang="pl-PL" dirty="0">
-                <a:latin typeface="Consolas" panose="020B0609020204030204" pitchFamily="49" charset="0"/>
-                <a:cs typeface="Consolas" panose="020B0609020204030204" pitchFamily="49" charset="0"/>
-              </a:rPr>
-              <a:t> </a:t>
-            </a:r>
-            <a:r>
-              <a:rPr lang="pl-PL" dirty="0" err="1">
-                <a:latin typeface="Consolas" panose="020B0609020204030204" pitchFamily="49" charset="0"/>
-                <a:cs typeface="Consolas" panose="020B0609020204030204" pitchFamily="49" charset="0"/>
-              </a:rPr>
-              <a:t>long</a:t>
-            </a:r>
-            <a:r>
-              <a:rPr lang="pl-PL" dirty="0">
-                <a:latin typeface="Consolas" panose="020B0609020204030204" pitchFamily="49" charset="0"/>
-                <a:cs typeface="Consolas" panose="020B0609020204030204" pitchFamily="49" charset="0"/>
-              </a:rPr>
-              <a:t> </a:t>
-            </a:r>
-            <a:r>
-              <a:rPr lang="pl-PL" dirty="0" err="1">
-                <a:latin typeface="Consolas" panose="020B0609020204030204" pitchFamily="49" charset="0"/>
-                <a:cs typeface="Consolas" panose="020B0609020204030204" pitchFamily="49" charset="0"/>
-              </a:rPr>
-              <a:t>int</a:t>
-            </a:r>
-            <a:endParaRPr lang="pl-PL" dirty="0">
-              <a:latin typeface="Consolas" panose="020B0609020204030204" pitchFamily="49" charset="0"/>
-              <a:cs typeface="Consolas" panose="020B0609020204030204" pitchFamily="49" charset="0"/>
-            </a:endParaRPr>
-          </a:p>
-          <a:p>
-            <a:r>
-              <a:rPr lang="pl-PL" dirty="0" err="1">
-                <a:latin typeface="Consolas" panose="020B0609020204030204" pitchFamily="49" charset="0"/>
-                <a:cs typeface="Consolas" panose="020B0609020204030204" pitchFamily="49" charset="0"/>
-              </a:rPr>
-              <a:t>short</a:t>
-            </a:r>
-            <a:endParaRPr lang="pl-PL" dirty="0">
-              <a:latin typeface="Consolas" panose="020B0609020204030204" pitchFamily="49" charset="0"/>
-              <a:cs typeface="Consolas" panose="020B0609020204030204" pitchFamily="49" charset="0"/>
-            </a:endParaRPr>
-          </a:p>
-          <a:p>
-            <a:r>
-              <a:rPr lang="pl-PL" dirty="0" err="1">
-                <a:latin typeface="Consolas" panose="020B0609020204030204" pitchFamily="49" charset="0"/>
-                <a:cs typeface="Consolas" panose="020B0609020204030204" pitchFamily="49" charset="0"/>
-              </a:rPr>
-              <a:t>unsigned</a:t>
-            </a:r>
-            <a:r>
-              <a:rPr lang="pl-PL" dirty="0">
-                <a:latin typeface="Consolas" panose="020B0609020204030204" pitchFamily="49" charset="0"/>
-                <a:cs typeface="Consolas" panose="020B0609020204030204" pitchFamily="49" charset="0"/>
-              </a:rPr>
-              <a:t> </a:t>
-            </a:r>
-            <a:r>
-              <a:rPr lang="pl-PL" dirty="0" err="1">
-                <a:latin typeface="Consolas" panose="020B0609020204030204" pitchFamily="49" charset="0"/>
-                <a:cs typeface="Consolas" panose="020B0609020204030204" pitchFamily="49" charset="0"/>
-              </a:rPr>
-              <a:t>short</a:t>
-            </a:r>
-            <a:endParaRPr lang="pl-PL" dirty="0">
-              <a:latin typeface="Consolas" panose="020B0609020204030204" pitchFamily="49" charset="0"/>
-              <a:cs typeface="Consolas" panose="020B0609020204030204" pitchFamily="49" charset="0"/>
-            </a:endParaRPr>
+              <a:rPr lang="pl-PL" dirty="0"/>
+              <a:t>Każdy typ zmiennej ograniczony jest do przechowywania określonego rodzaju danych</a:t>
+            </a:r>
+          </a:p>
+          <a:p>
+            <a:r>
+              <a:rPr lang="pl-PL" dirty="0"/>
+              <a:t>Każdy typ ma też określony zakres danych, jakie może przechowywać</a:t>
+            </a:r>
           </a:p>
         </p:txBody>
       </p:sp>
     </p:spTree>
     <p:extLst>
       <p:ext uri="{BB962C8B-B14F-4D97-AF65-F5344CB8AC3E}">
-        <p14:creationId xmlns:p14="http://schemas.microsoft.com/office/powerpoint/2010/main" val="48606609"/>
+        <p14:creationId xmlns:p14="http://schemas.microsoft.com/office/powerpoint/2010/main" val="1629198912"/>
       </p:ext>
     </p:extLst>
   </p:cSld>
@@ -4014,7 +3917,13 @@
       </p:grpSpPr>
       <p:sp>
         <p:nvSpPr>
-          <p:cNvPr id="2" name="Tytuł 1"/>
+          <p:cNvPr id="2" name="Tytuł 1">
+            <a:extLst>
+              <a:ext uri="{FF2B5EF4-FFF2-40B4-BE49-F238E27FC236}">
+                <a16:creationId xmlns:a16="http://schemas.microsoft.com/office/drawing/2014/main" id="{B2B4EF50-E6D5-4140-8563-56724B3BE24E}"/>
+              </a:ext>
+            </a:extLst>
+          </p:cNvPr>
           <p:cNvSpPr>
             <a:spLocks noGrp="1"/>
           </p:cNvSpPr>
@@ -4029,97 +3938,1106 @@
           <a:p>
             <a:r>
               <a:rPr lang="pl-PL" dirty="0"/>
-              <a:t>Liczby rzeczywiste</a:t>
-            </a:r>
-          </a:p>
-        </p:txBody>
-      </p:sp>
-      <p:sp>
-        <p:nvSpPr>
-          <p:cNvPr id="3" name="Symbol zastępczy zawartości 2"/>
-          <p:cNvSpPr>
-            <a:spLocks noGrp="1"/>
-          </p:cNvSpPr>
+              <a:t>Liczby całkowite</a:t>
+            </a:r>
+          </a:p>
+        </p:txBody>
+      </p:sp>
+      <p:graphicFrame>
+        <p:nvGraphicFramePr>
+          <p:cNvPr id="5" name="Symbol zastępczy zawartości 4">
+            <a:extLst>
+              <a:ext uri="{FF2B5EF4-FFF2-40B4-BE49-F238E27FC236}">
+                <a16:creationId xmlns:a16="http://schemas.microsoft.com/office/drawing/2014/main" id="{8BD5AEE0-4BE5-5743-9B44-7A1D05C851F5}"/>
+              </a:ext>
+            </a:extLst>
+          </p:cNvPr>
+          <p:cNvGraphicFramePr>
+            <a:graphicFrameLocks noGrp="1"/>
+          </p:cNvGraphicFramePr>
           <p:nvPr>
             <p:ph idx="1"/>
-          </p:nvPr>
-        </p:nvSpPr>
-        <p:spPr/>
-        <p:txBody>
-          <a:bodyPr/>
-          <a:lstStyle/>
-          <a:p>
-            <a:r>
-              <a:rPr lang="pl-PL" dirty="0" err="1">
-                <a:latin typeface="Consolas" panose="020B0609020204030204" pitchFamily="49" charset="0"/>
-                <a:cs typeface="Consolas" panose="020B0609020204030204" pitchFamily="49" charset="0"/>
-              </a:rPr>
-              <a:t>float</a:t>
-            </a:r>
-            <a:r>
-              <a:rPr lang="pl-PL" dirty="0"/>
-              <a:t> – </a:t>
-            </a:r>
-            <a:r>
-              <a:rPr lang="pl-PL" dirty="0" err="1"/>
-              <a:t>pojedyńcza</a:t>
-            </a:r>
-            <a:r>
-              <a:rPr lang="pl-PL" dirty="0"/>
-              <a:t> precyzja</a:t>
-            </a:r>
-          </a:p>
-          <a:p>
-            <a:r>
-              <a:rPr lang="pl-PL" dirty="0" err="1">
-                <a:latin typeface="Consolas" panose="020B0609020204030204" pitchFamily="49" charset="0"/>
-                <a:cs typeface="Consolas" panose="020B0609020204030204" pitchFamily="49" charset="0"/>
-              </a:rPr>
-              <a:t>double</a:t>
-            </a:r>
-            <a:r>
-              <a:rPr lang="pl-PL" dirty="0"/>
-              <a:t> – podwójna </a:t>
-            </a:r>
-            <a:r>
-              <a:rPr lang="pl-PL" dirty="0" err="1"/>
-              <a:t>prezycja</a:t>
-            </a:r>
-            <a:endParaRPr lang="pl-PL" dirty="0"/>
-          </a:p>
-          <a:p>
-            <a:r>
-              <a:rPr lang="pl-PL" dirty="0" err="1">
-                <a:latin typeface="Consolas" panose="020B0609020204030204" pitchFamily="49" charset="0"/>
-                <a:cs typeface="Consolas" panose="020B0609020204030204" pitchFamily="49" charset="0"/>
-              </a:rPr>
-              <a:t>long</a:t>
-            </a:r>
-            <a:r>
-              <a:rPr lang="pl-PL" dirty="0">
-                <a:latin typeface="Consolas" panose="020B0609020204030204" pitchFamily="49" charset="0"/>
-                <a:cs typeface="Consolas" panose="020B0609020204030204" pitchFamily="49" charset="0"/>
-              </a:rPr>
-              <a:t> </a:t>
-            </a:r>
-            <a:r>
-              <a:rPr lang="pl-PL" dirty="0" err="1">
-                <a:latin typeface="Consolas" panose="020B0609020204030204" pitchFamily="49" charset="0"/>
-                <a:cs typeface="Consolas" panose="020B0609020204030204" pitchFamily="49" charset="0"/>
-              </a:rPr>
-              <a:t>double</a:t>
-            </a:r>
-            <a:endParaRPr lang="pl-PL" dirty="0">
-              <a:latin typeface="Consolas" panose="020B0609020204030204" pitchFamily="49" charset="0"/>
-              <a:cs typeface="Consolas" panose="020B0609020204030204" pitchFamily="49" charset="0"/>
-            </a:endParaRPr>
-          </a:p>
-        </p:txBody>
-      </p:sp>
+            <p:extLst>
+              <p:ext uri="{D42A27DB-BD31-4B8C-83A1-F6EECF244321}">
+                <p14:modId xmlns:p14="http://schemas.microsoft.com/office/powerpoint/2010/main" val="1290071771"/>
+              </p:ext>
+            </p:extLst>
+          </p:nvPr>
+        </p:nvGraphicFramePr>
+        <p:xfrm>
+          <a:off x="838200" y="1825625"/>
+          <a:ext cx="10515600" cy="3332480"/>
+        </p:xfrm>
+        <a:graphic>
+          <a:graphicData uri="http://schemas.openxmlformats.org/drawingml/2006/table">
+            <a:tbl>
+              <a:tblPr firstRow="1" bandRow="1">
+                <a:tableStyleId>{5C22544A-7EE6-4342-B048-85BDC9FD1C3A}</a:tableStyleId>
+              </a:tblPr>
+              <a:tblGrid>
+                <a:gridCol w="3505200">
+                  <a:extLst>
+                    <a:ext uri="{9D8B030D-6E8A-4147-A177-3AD203B41FA5}">
+                      <a16:colId xmlns:a16="http://schemas.microsoft.com/office/drawing/2014/main" val="331973627"/>
+                    </a:ext>
+                  </a:extLst>
+                </a:gridCol>
+                <a:gridCol w="3505200">
+                  <a:extLst>
+                    <a:ext uri="{9D8B030D-6E8A-4147-A177-3AD203B41FA5}">
+                      <a16:colId xmlns:a16="http://schemas.microsoft.com/office/drawing/2014/main" val="1788878907"/>
+                    </a:ext>
+                  </a:extLst>
+                </a:gridCol>
+                <a:gridCol w="3505200">
+                  <a:extLst>
+                    <a:ext uri="{9D8B030D-6E8A-4147-A177-3AD203B41FA5}">
+                      <a16:colId xmlns:a16="http://schemas.microsoft.com/office/drawing/2014/main" val="2810744997"/>
+                    </a:ext>
+                  </a:extLst>
+                </a:gridCol>
+              </a:tblGrid>
+              <a:tr h="370840">
+                <a:tc>
+                  <a:txBody>
+                    <a:bodyPr/>
+                    <a:lstStyle/>
+                    <a:p>
+                      <a:r>
+                        <a:rPr lang="pl-PL" dirty="0"/>
+                        <a:t>Typ</a:t>
+                      </a:r>
+                    </a:p>
+                  </a:txBody>
+                  <a:tcPr/>
+                </a:tc>
+                <a:tc>
+                  <a:txBody>
+                    <a:bodyPr/>
+                    <a:lstStyle/>
+                    <a:p>
+                      <a:r>
+                        <a:rPr lang="pl-PL" dirty="0"/>
+                        <a:t>Ilość bajtów</a:t>
+                      </a:r>
+                    </a:p>
+                  </a:txBody>
+                  <a:tcPr/>
+                </a:tc>
+                <a:tc>
+                  <a:txBody>
+                    <a:bodyPr/>
+                    <a:lstStyle/>
+                    <a:p>
+                      <a:r>
+                        <a:rPr lang="pl-PL" dirty="0"/>
+                        <a:t>Zakres</a:t>
+                      </a:r>
+                    </a:p>
+                  </a:txBody>
+                  <a:tcPr/>
+                </a:tc>
+                <a:extLst>
+                  <a:ext uri="{0D108BD9-81ED-4DB2-BD59-A6C34878D82A}">
+                    <a16:rowId xmlns:a16="http://schemas.microsoft.com/office/drawing/2014/main" val="1663831127"/>
+                  </a:ext>
+                </a:extLst>
+              </a:tr>
+              <a:tr h="370840">
+                <a:tc>
+                  <a:txBody>
+                    <a:bodyPr/>
+                    <a:lstStyle/>
+                    <a:p>
+                      <a:r>
+                        <a:rPr lang="pl-PL" dirty="0" err="1">
+                          <a:latin typeface="Consolas" panose="020B0609020204030204" pitchFamily="49" charset="0"/>
+                          <a:cs typeface="Consolas" panose="020B0609020204030204" pitchFamily="49" charset="0"/>
+                        </a:rPr>
+                        <a:t>short</a:t>
+                      </a:r>
+                      <a:endParaRPr lang="pl-PL" dirty="0">
+                        <a:latin typeface="Consolas" panose="020B0609020204030204" pitchFamily="49" charset="0"/>
+                        <a:cs typeface="Consolas" panose="020B0609020204030204" pitchFamily="49" charset="0"/>
+                      </a:endParaRPr>
+                    </a:p>
+                  </a:txBody>
+                  <a:tcPr/>
+                </a:tc>
+                <a:tc>
+                  <a:txBody>
+                    <a:bodyPr/>
+                    <a:lstStyle/>
+                    <a:p>
+                      <a:r>
+                        <a:rPr lang="pl-PL" dirty="0">
+                          <a:latin typeface="Consolas" panose="020B0609020204030204" pitchFamily="49" charset="0"/>
+                          <a:cs typeface="Consolas" panose="020B0609020204030204" pitchFamily="49" charset="0"/>
+                        </a:rPr>
+                        <a:t>2</a:t>
+                      </a:r>
+                    </a:p>
+                  </a:txBody>
+                  <a:tcPr/>
+                </a:tc>
+                <a:tc>
+                  <a:txBody>
+                    <a:bodyPr/>
+                    <a:lstStyle/>
+                    <a:p>
+                      <a:pPr marL="0" marR="0" lvl="0" indent="0" algn="l" defTabSz="914400" rtl="0" eaLnBrk="1" fontAlgn="auto" latinLnBrk="0" hangingPunct="1">
+                        <a:lnSpc>
+                          <a:spcPct val="100000"/>
+                        </a:lnSpc>
+                        <a:spcBef>
+                          <a:spcPts val="0"/>
+                        </a:spcBef>
+                        <a:spcAft>
+                          <a:spcPts val="0"/>
+                        </a:spcAft>
+                        <a:buClrTx/>
+                        <a:buSzTx/>
+                        <a:buFontTx/>
+                        <a:buNone/>
+                        <a:tabLst/>
+                        <a:defRPr/>
+                      </a:pPr>
+                      <a:r>
+                        <a:rPr lang="pl-PL" dirty="0">
+                          <a:latin typeface="Consolas" panose="020B0609020204030204" pitchFamily="49" charset="0"/>
+                          <a:cs typeface="Consolas" panose="020B0609020204030204" pitchFamily="49" charset="0"/>
+                        </a:rPr>
+                        <a:t>-2</a:t>
+                      </a:r>
+                      <a:r>
+                        <a:rPr lang="pl-PL" baseline="30000" dirty="0">
+                          <a:latin typeface="Consolas" panose="020B0609020204030204" pitchFamily="49" charset="0"/>
+                          <a:cs typeface="Consolas" panose="020B0609020204030204" pitchFamily="49" charset="0"/>
+                        </a:rPr>
+                        <a:t>15 </a:t>
+                      </a:r>
+                      <a:r>
+                        <a:rPr lang="pl-PL" baseline="0" dirty="0">
+                          <a:latin typeface="Consolas" panose="020B0609020204030204" pitchFamily="49" charset="0"/>
+                          <a:cs typeface="Consolas" panose="020B0609020204030204" pitchFamily="49" charset="0"/>
+                        </a:rPr>
+                        <a:t>-&gt; 2</a:t>
+                      </a:r>
+                      <a:r>
+                        <a:rPr lang="pl-PL" baseline="30000" dirty="0">
+                          <a:latin typeface="Consolas" panose="020B0609020204030204" pitchFamily="49" charset="0"/>
+                          <a:cs typeface="Consolas" panose="020B0609020204030204" pitchFamily="49" charset="0"/>
+                        </a:rPr>
+                        <a:t>15</a:t>
+                      </a:r>
+                      <a:r>
+                        <a:rPr lang="pl-PL" baseline="0" dirty="0">
+                          <a:latin typeface="Consolas" panose="020B0609020204030204" pitchFamily="49" charset="0"/>
+                          <a:cs typeface="Consolas" panose="020B0609020204030204" pitchFamily="49" charset="0"/>
+                        </a:rPr>
+                        <a:t>-1</a:t>
+                      </a:r>
+                      <a:endParaRPr lang="pl-PL" baseline="30000" dirty="0">
+                        <a:latin typeface="Consolas" panose="020B0609020204030204" pitchFamily="49" charset="0"/>
+                        <a:cs typeface="Consolas" panose="020B0609020204030204" pitchFamily="49" charset="0"/>
+                      </a:endParaRPr>
+                    </a:p>
+                  </a:txBody>
+                  <a:tcPr/>
+                </a:tc>
+                <a:extLst>
+                  <a:ext uri="{0D108BD9-81ED-4DB2-BD59-A6C34878D82A}">
+                    <a16:rowId xmlns:a16="http://schemas.microsoft.com/office/drawing/2014/main" val="2915682256"/>
+                  </a:ext>
+                </a:extLst>
+              </a:tr>
+              <a:tr h="370840">
+                <a:tc>
+                  <a:txBody>
+                    <a:bodyPr/>
+                    <a:lstStyle/>
+                    <a:p>
+                      <a:r>
+                        <a:rPr lang="pl-PL" dirty="0" err="1">
+                          <a:latin typeface="Consolas" panose="020B0609020204030204" pitchFamily="49" charset="0"/>
+                          <a:cs typeface="Consolas" panose="020B0609020204030204" pitchFamily="49" charset="0"/>
+                        </a:rPr>
+                        <a:t>int</a:t>
+                      </a:r>
+                      <a:endParaRPr lang="pl-PL" dirty="0">
+                        <a:latin typeface="Consolas" panose="020B0609020204030204" pitchFamily="49" charset="0"/>
+                        <a:cs typeface="Consolas" panose="020B0609020204030204" pitchFamily="49" charset="0"/>
+                      </a:endParaRPr>
+                    </a:p>
+                  </a:txBody>
+                  <a:tcPr/>
+                </a:tc>
+                <a:tc>
+                  <a:txBody>
+                    <a:bodyPr/>
+                    <a:lstStyle/>
+                    <a:p>
+                      <a:r>
+                        <a:rPr lang="pl-PL" dirty="0">
+                          <a:latin typeface="Consolas" panose="020B0609020204030204" pitchFamily="49" charset="0"/>
+                          <a:cs typeface="Consolas" panose="020B0609020204030204" pitchFamily="49" charset="0"/>
+                        </a:rPr>
+                        <a:t>4</a:t>
+                      </a:r>
+                    </a:p>
+                  </a:txBody>
+                  <a:tcPr/>
+                </a:tc>
+                <a:tc>
+                  <a:txBody>
+                    <a:bodyPr/>
+                    <a:lstStyle/>
+                    <a:p>
+                      <a:r>
+                        <a:rPr lang="pl-PL" dirty="0">
+                          <a:latin typeface="Consolas" panose="020B0609020204030204" pitchFamily="49" charset="0"/>
+                          <a:cs typeface="Consolas" panose="020B0609020204030204" pitchFamily="49" charset="0"/>
+                        </a:rPr>
+                        <a:t>-2</a:t>
+                      </a:r>
+                      <a:r>
+                        <a:rPr lang="pl-PL" baseline="30000" dirty="0">
+                          <a:latin typeface="Consolas" panose="020B0609020204030204" pitchFamily="49" charset="0"/>
+                          <a:cs typeface="Consolas" panose="020B0609020204030204" pitchFamily="49" charset="0"/>
+                        </a:rPr>
+                        <a:t>31 </a:t>
+                      </a:r>
+                      <a:r>
+                        <a:rPr lang="pl-PL" baseline="0" dirty="0">
+                          <a:latin typeface="Consolas" panose="020B0609020204030204" pitchFamily="49" charset="0"/>
+                          <a:cs typeface="Consolas" panose="020B0609020204030204" pitchFamily="49" charset="0"/>
+                        </a:rPr>
+                        <a:t>-&gt; 2</a:t>
+                      </a:r>
+                      <a:r>
+                        <a:rPr lang="pl-PL" baseline="30000" dirty="0">
+                          <a:latin typeface="Consolas" panose="020B0609020204030204" pitchFamily="49" charset="0"/>
+                          <a:cs typeface="Consolas" panose="020B0609020204030204" pitchFamily="49" charset="0"/>
+                        </a:rPr>
+                        <a:t>31</a:t>
+                      </a:r>
+                      <a:r>
+                        <a:rPr lang="pl-PL" baseline="0" dirty="0">
+                          <a:latin typeface="Consolas" panose="020B0609020204030204" pitchFamily="49" charset="0"/>
+                          <a:cs typeface="Consolas" panose="020B0609020204030204" pitchFamily="49" charset="0"/>
+                        </a:rPr>
+                        <a:t>-1</a:t>
+                      </a:r>
+                      <a:endParaRPr lang="pl-PL" baseline="30000" dirty="0">
+                        <a:latin typeface="Consolas" panose="020B0609020204030204" pitchFamily="49" charset="0"/>
+                        <a:cs typeface="Consolas" panose="020B0609020204030204" pitchFamily="49" charset="0"/>
+                      </a:endParaRPr>
+                    </a:p>
+                  </a:txBody>
+                  <a:tcPr/>
+                </a:tc>
+                <a:extLst>
+                  <a:ext uri="{0D108BD9-81ED-4DB2-BD59-A6C34878D82A}">
+                    <a16:rowId xmlns:a16="http://schemas.microsoft.com/office/drawing/2014/main" val="287385622"/>
+                  </a:ext>
+                </a:extLst>
+              </a:tr>
+              <a:tr h="370840">
+                <a:tc>
+                  <a:txBody>
+                    <a:bodyPr/>
+                    <a:lstStyle/>
+                    <a:p>
+                      <a:r>
+                        <a:rPr lang="pl-PL" dirty="0" err="1">
+                          <a:latin typeface="Consolas" panose="020B0609020204030204" pitchFamily="49" charset="0"/>
+                          <a:cs typeface="Consolas" panose="020B0609020204030204" pitchFamily="49" charset="0"/>
+                        </a:rPr>
+                        <a:t>long</a:t>
+                      </a:r>
+                      <a:r>
+                        <a:rPr lang="pl-PL" dirty="0">
+                          <a:latin typeface="Consolas" panose="020B0609020204030204" pitchFamily="49" charset="0"/>
+                          <a:cs typeface="Consolas" panose="020B0609020204030204" pitchFamily="49" charset="0"/>
+                        </a:rPr>
+                        <a:t> </a:t>
+                      </a:r>
+                      <a:r>
+                        <a:rPr lang="pl-PL" dirty="0" err="1">
+                          <a:latin typeface="Consolas" panose="020B0609020204030204" pitchFamily="49" charset="0"/>
+                          <a:cs typeface="Consolas" panose="020B0609020204030204" pitchFamily="49" charset="0"/>
+                        </a:rPr>
+                        <a:t>int</a:t>
+                      </a:r>
+                      <a:endParaRPr lang="pl-PL" dirty="0">
+                        <a:latin typeface="Consolas" panose="020B0609020204030204" pitchFamily="49" charset="0"/>
+                        <a:cs typeface="Consolas" panose="020B0609020204030204" pitchFamily="49" charset="0"/>
+                      </a:endParaRPr>
+                    </a:p>
+                  </a:txBody>
+                  <a:tcPr/>
+                </a:tc>
+                <a:tc>
+                  <a:txBody>
+                    <a:bodyPr/>
+                    <a:lstStyle/>
+                    <a:p>
+                      <a:r>
+                        <a:rPr lang="pl-PL" dirty="0">
+                          <a:latin typeface="Consolas" panose="020B0609020204030204" pitchFamily="49" charset="0"/>
+                          <a:cs typeface="Consolas" panose="020B0609020204030204" pitchFamily="49" charset="0"/>
+                        </a:rPr>
+                        <a:t>4</a:t>
+                      </a:r>
+                    </a:p>
+                  </a:txBody>
+                  <a:tcPr/>
+                </a:tc>
+                <a:tc>
+                  <a:txBody>
+                    <a:bodyPr/>
+                    <a:lstStyle/>
+                    <a:p>
+                      <a:pPr marL="0" marR="0" lvl="0" indent="0" algn="l" defTabSz="914400" rtl="0" eaLnBrk="1" fontAlgn="auto" latinLnBrk="0" hangingPunct="1">
+                        <a:lnSpc>
+                          <a:spcPct val="100000"/>
+                        </a:lnSpc>
+                        <a:spcBef>
+                          <a:spcPts val="0"/>
+                        </a:spcBef>
+                        <a:spcAft>
+                          <a:spcPts val="0"/>
+                        </a:spcAft>
+                        <a:buClrTx/>
+                        <a:buSzTx/>
+                        <a:buFontTx/>
+                        <a:buNone/>
+                        <a:tabLst/>
+                        <a:defRPr/>
+                      </a:pPr>
+                      <a:r>
+                        <a:rPr lang="pl-PL" dirty="0">
+                          <a:latin typeface="Consolas" panose="020B0609020204030204" pitchFamily="49" charset="0"/>
+                          <a:cs typeface="Consolas" panose="020B0609020204030204" pitchFamily="49" charset="0"/>
+                        </a:rPr>
+                        <a:t>-2</a:t>
+                      </a:r>
+                      <a:r>
+                        <a:rPr lang="pl-PL" baseline="30000" dirty="0">
+                          <a:latin typeface="Consolas" panose="020B0609020204030204" pitchFamily="49" charset="0"/>
+                          <a:cs typeface="Consolas" panose="020B0609020204030204" pitchFamily="49" charset="0"/>
+                        </a:rPr>
+                        <a:t>31 </a:t>
+                      </a:r>
+                      <a:r>
+                        <a:rPr lang="pl-PL" baseline="0" dirty="0">
+                          <a:latin typeface="Consolas" panose="020B0609020204030204" pitchFamily="49" charset="0"/>
+                          <a:cs typeface="Consolas" panose="020B0609020204030204" pitchFamily="49" charset="0"/>
+                        </a:rPr>
+                        <a:t>-&gt; 2</a:t>
+                      </a:r>
+                      <a:r>
+                        <a:rPr lang="pl-PL" baseline="30000" dirty="0">
+                          <a:latin typeface="Consolas" panose="020B0609020204030204" pitchFamily="49" charset="0"/>
+                          <a:cs typeface="Consolas" panose="020B0609020204030204" pitchFamily="49" charset="0"/>
+                        </a:rPr>
+                        <a:t>31</a:t>
+                      </a:r>
+                      <a:r>
+                        <a:rPr lang="pl-PL" baseline="0" dirty="0">
+                          <a:latin typeface="Consolas" panose="020B0609020204030204" pitchFamily="49" charset="0"/>
+                          <a:cs typeface="Consolas" panose="020B0609020204030204" pitchFamily="49" charset="0"/>
+                        </a:rPr>
+                        <a:t>-1</a:t>
+                      </a:r>
+                      <a:endParaRPr lang="pl-PL" baseline="30000" dirty="0">
+                        <a:latin typeface="Consolas" panose="020B0609020204030204" pitchFamily="49" charset="0"/>
+                        <a:cs typeface="Consolas" panose="020B0609020204030204" pitchFamily="49" charset="0"/>
+                      </a:endParaRPr>
+                    </a:p>
+                  </a:txBody>
+                  <a:tcPr/>
+                </a:tc>
+                <a:extLst>
+                  <a:ext uri="{0D108BD9-81ED-4DB2-BD59-A6C34878D82A}">
+                    <a16:rowId xmlns:a16="http://schemas.microsoft.com/office/drawing/2014/main" val="3248532885"/>
+                  </a:ext>
+                </a:extLst>
+              </a:tr>
+              <a:tr h="370840">
+                <a:tc>
+                  <a:txBody>
+                    <a:bodyPr/>
+                    <a:lstStyle/>
+                    <a:p>
+                      <a:r>
+                        <a:rPr lang="pl-PL" dirty="0" err="1">
+                          <a:latin typeface="Consolas" panose="020B0609020204030204" pitchFamily="49" charset="0"/>
+                          <a:cs typeface="Consolas" panose="020B0609020204030204" pitchFamily="49" charset="0"/>
+                        </a:rPr>
+                        <a:t>long</a:t>
+                      </a:r>
+                      <a:r>
+                        <a:rPr lang="pl-PL" dirty="0">
+                          <a:latin typeface="Consolas" panose="020B0609020204030204" pitchFamily="49" charset="0"/>
+                          <a:cs typeface="Consolas" panose="020B0609020204030204" pitchFamily="49" charset="0"/>
+                        </a:rPr>
+                        <a:t> </a:t>
+                      </a:r>
+                      <a:r>
+                        <a:rPr lang="pl-PL" dirty="0" err="1">
+                          <a:latin typeface="Consolas" panose="020B0609020204030204" pitchFamily="49" charset="0"/>
+                          <a:cs typeface="Consolas" panose="020B0609020204030204" pitchFamily="49" charset="0"/>
+                        </a:rPr>
+                        <a:t>long</a:t>
+                      </a:r>
+                      <a:r>
+                        <a:rPr lang="pl-PL" dirty="0">
+                          <a:latin typeface="Consolas" panose="020B0609020204030204" pitchFamily="49" charset="0"/>
+                          <a:cs typeface="Consolas" panose="020B0609020204030204" pitchFamily="49" charset="0"/>
+                        </a:rPr>
+                        <a:t> </a:t>
+                      </a:r>
+                      <a:r>
+                        <a:rPr lang="pl-PL" dirty="0" err="1">
+                          <a:latin typeface="Consolas" panose="020B0609020204030204" pitchFamily="49" charset="0"/>
+                          <a:cs typeface="Consolas" panose="020B0609020204030204" pitchFamily="49" charset="0"/>
+                        </a:rPr>
+                        <a:t>int</a:t>
+                      </a:r>
+                      <a:endParaRPr lang="pl-PL" dirty="0">
+                        <a:latin typeface="Consolas" panose="020B0609020204030204" pitchFamily="49" charset="0"/>
+                        <a:cs typeface="Consolas" panose="020B0609020204030204" pitchFamily="49" charset="0"/>
+                      </a:endParaRPr>
+                    </a:p>
+                  </a:txBody>
+                  <a:tcPr/>
+                </a:tc>
+                <a:tc>
+                  <a:txBody>
+                    <a:bodyPr/>
+                    <a:lstStyle/>
+                    <a:p>
+                      <a:r>
+                        <a:rPr lang="pl-PL" dirty="0">
+                          <a:latin typeface="Consolas" panose="020B0609020204030204" pitchFamily="49" charset="0"/>
+                          <a:cs typeface="Consolas" panose="020B0609020204030204" pitchFamily="49" charset="0"/>
+                        </a:rPr>
+                        <a:t>8</a:t>
+                      </a:r>
+                    </a:p>
+                  </a:txBody>
+                  <a:tcPr/>
+                </a:tc>
+                <a:tc>
+                  <a:txBody>
+                    <a:bodyPr/>
+                    <a:lstStyle/>
+                    <a:p>
+                      <a:pPr marL="0" marR="0" lvl="0" indent="0" algn="l" defTabSz="914400" rtl="0" eaLnBrk="1" fontAlgn="auto" latinLnBrk="0" hangingPunct="1">
+                        <a:lnSpc>
+                          <a:spcPct val="100000"/>
+                        </a:lnSpc>
+                        <a:spcBef>
+                          <a:spcPts val="0"/>
+                        </a:spcBef>
+                        <a:spcAft>
+                          <a:spcPts val="0"/>
+                        </a:spcAft>
+                        <a:buClrTx/>
+                        <a:buSzTx/>
+                        <a:buFontTx/>
+                        <a:buNone/>
+                        <a:tabLst/>
+                        <a:defRPr/>
+                      </a:pPr>
+                      <a:r>
+                        <a:rPr lang="pl-PL" dirty="0">
+                          <a:latin typeface="Consolas" panose="020B0609020204030204" pitchFamily="49" charset="0"/>
+                          <a:cs typeface="Consolas" panose="020B0609020204030204" pitchFamily="49" charset="0"/>
+                        </a:rPr>
+                        <a:t>-2</a:t>
+                      </a:r>
+                      <a:r>
+                        <a:rPr lang="pl-PL" baseline="30000" dirty="0">
+                          <a:latin typeface="Consolas" panose="020B0609020204030204" pitchFamily="49" charset="0"/>
+                          <a:cs typeface="Consolas" panose="020B0609020204030204" pitchFamily="49" charset="0"/>
+                        </a:rPr>
+                        <a:t>63 </a:t>
+                      </a:r>
+                      <a:r>
+                        <a:rPr lang="pl-PL" baseline="0" dirty="0">
+                          <a:latin typeface="Consolas" panose="020B0609020204030204" pitchFamily="49" charset="0"/>
+                          <a:cs typeface="Consolas" panose="020B0609020204030204" pitchFamily="49" charset="0"/>
+                        </a:rPr>
+                        <a:t>-&gt; 2</a:t>
+                      </a:r>
+                      <a:r>
+                        <a:rPr lang="pl-PL" baseline="30000" dirty="0">
+                          <a:latin typeface="Consolas" panose="020B0609020204030204" pitchFamily="49" charset="0"/>
+                          <a:cs typeface="Consolas" panose="020B0609020204030204" pitchFamily="49" charset="0"/>
+                        </a:rPr>
+                        <a:t>63</a:t>
+                      </a:r>
+                      <a:r>
+                        <a:rPr lang="pl-PL" baseline="0" dirty="0">
+                          <a:latin typeface="Consolas" panose="020B0609020204030204" pitchFamily="49" charset="0"/>
+                          <a:cs typeface="Consolas" panose="020B0609020204030204" pitchFamily="49" charset="0"/>
+                        </a:rPr>
+                        <a:t>-1</a:t>
+                      </a:r>
+                      <a:endParaRPr lang="pl-PL" baseline="30000" dirty="0">
+                        <a:latin typeface="Consolas" panose="020B0609020204030204" pitchFamily="49" charset="0"/>
+                        <a:cs typeface="Consolas" panose="020B0609020204030204" pitchFamily="49" charset="0"/>
+                      </a:endParaRPr>
+                    </a:p>
+                  </a:txBody>
+                  <a:tcPr/>
+                </a:tc>
+                <a:extLst>
+                  <a:ext uri="{0D108BD9-81ED-4DB2-BD59-A6C34878D82A}">
+                    <a16:rowId xmlns:a16="http://schemas.microsoft.com/office/drawing/2014/main" val="2548296978"/>
+                  </a:ext>
+                </a:extLst>
+              </a:tr>
+              <a:tr h="370840">
+                <a:tc>
+                  <a:txBody>
+                    <a:bodyPr/>
+                    <a:lstStyle/>
+                    <a:p>
+                      <a:r>
+                        <a:rPr lang="pl-PL" dirty="0" err="1">
+                          <a:latin typeface="Consolas" panose="020B0609020204030204" pitchFamily="49" charset="0"/>
+                          <a:cs typeface="Consolas" panose="020B0609020204030204" pitchFamily="49" charset="0"/>
+                        </a:rPr>
+                        <a:t>unsigned</a:t>
+                      </a:r>
+                      <a:r>
+                        <a:rPr lang="pl-PL" dirty="0">
+                          <a:latin typeface="Consolas" panose="020B0609020204030204" pitchFamily="49" charset="0"/>
+                          <a:cs typeface="Consolas" panose="020B0609020204030204" pitchFamily="49" charset="0"/>
+                        </a:rPr>
+                        <a:t> </a:t>
+                      </a:r>
+                      <a:r>
+                        <a:rPr lang="pl-PL" dirty="0" err="1">
+                          <a:latin typeface="Consolas" panose="020B0609020204030204" pitchFamily="49" charset="0"/>
+                          <a:cs typeface="Consolas" panose="020B0609020204030204" pitchFamily="49" charset="0"/>
+                        </a:rPr>
+                        <a:t>short</a:t>
+                      </a:r>
+                      <a:endParaRPr lang="pl-PL" dirty="0">
+                        <a:latin typeface="Consolas" panose="020B0609020204030204" pitchFamily="49" charset="0"/>
+                        <a:cs typeface="Consolas" panose="020B0609020204030204" pitchFamily="49" charset="0"/>
+                      </a:endParaRPr>
+                    </a:p>
+                  </a:txBody>
+                  <a:tcPr/>
+                </a:tc>
+                <a:tc>
+                  <a:txBody>
+                    <a:bodyPr/>
+                    <a:lstStyle/>
+                    <a:p>
+                      <a:r>
+                        <a:rPr lang="pl-PL" dirty="0">
+                          <a:latin typeface="Consolas" panose="020B0609020204030204" pitchFamily="49" charset="0"/>
+                          <a:cs typeface="Consolas" panose="020B0609020204030204" pitchFamily="49" charset="0"/>
+                        </a:rPr>
+                        <a:t>2</a:t>
+                      </a:r>
+                    </a:p>
+                  </a:txBody>
+                  <a:tcPr/>
+                </a:tc>
+                <a:tc>
+                  <a:txBody>
+                    <a:bodyPr/>
+                    <a:lstStyle/>
+                    <a:p>
+                      <a:pPr marL="0" marR="0" lvl="0" indent="0" algn="l" defTabSz="914400" rtl="0" eaLnBrk="1" fontAlgn="auto" latinLnBrk="0" hangingPunct="1">
+                        <a:lnSpc>
+                          <a:spcPct val="100000"/>
+                        </a:lnSpc>
+                        <a:spcBef>
+                          <a:spcPts val="0"/>
+                        </a:spcBef>
+                        <a:spcAft>
+                          <a:spcPts val="0"/>
+                        </a:spcAft>
+                        <a:buClrTx/>
+                        <a:buSzTx/>
+                        <a:buFontTx/>
+                        <a:buNone/>
+                        <a:tabLst/>
+                        <a:defRPr/>
+                      </a:pPr>
+                      <a:r>
+                        <a:rPr lang="pl-PL" dirty="0">
+                          <a:latin typeface="Consolas" panose="020B0609020204030204" pitchFamily="49" charset="0"/>
+                          <a:cs typeface="Consolas" panose="020B0609020204030204" pitchFamily="49" charset="0"/>
+                        </a:rPr>
+                        <a:t>0</a:t>
+                      </a:r>
+                      <a:r>
+                        <a:rPr lang="pl-PL" baseline="30000" dirty="0">
+                          <a:latin typeface="Consolas" panose="020B0609020204030204" pitchFamily="49" charset="0"/>
+                          <a:cs typeface="Consolas" panose="020B0609020204030204" pitchFamily="49" charset="0"/>
+                        </a:rPr>
+                        <a:t> </a:t>
+                      </a:r>
+                      <a:r>
+                        <a:rPr lang="pl-PL" baseline="0" dirty="0">
+                          <a:latin typeface="Consolas" panose="020B0609020204030204" pitchFamily="49" charset="0"/>
+                          <a:cs typeface="Consolas" panose="020B0609020204030204" pitchFamily="49" charset="0"/>
+                        </a:rPr>
+                        <a:t>-&gt; 2</a:t>
+                      </a:r>
+                      <a:r>
+                        <a:rPr lang="pl-PL" baseline="30000" dirty="0">
+                          <a:latin typeface="Consolas" panose="020B0609020204030204" pitchFamily="49" charset="0"/>
+                          <a:cs typeface="Consolas" panose="020B0609020204030204" pitchFamily="49" charset="0"/>
+                        </a:rPr>
+                        <a:t>16</a:t>
+                      </a:r>
+                      <a:r>
+                        <a:rPr lang="pl-PL" baseline="0" dirty="0">
+                          <a:latin typeface="Consolas" panose="020B0609020204030204" pitchFamily="49" charset="0"/>
+                          <a:cs typeface="Consolas" panose="020B0609020204030204" pitchFamily="49" charset="0"/>
+                        </a:rPr>
+                        <a:t>-1</a:t>
+                      </a:r>
+                      <a:endParaRPr lang="pl-PL" baseline="30000" dirty="0">
+                        <a:latin typeface="Consolas" panose="020B0609020204030204" pitchFamily="49" charset="0"/>
+                        <a:cs typeface="Consolas" panose="020B0609020204030204" pitchFamily="49" charset="0"/>
+                      </a:endParaRPr>
+                    </a:p>
+                  </a:txBody>
+                  <a:tcPr/>
+                </a:tc>
+                <a:extLst>
+                  <a:ext uri="{0D108BD9-81ED-4DB2-BD59-A6C34878D82A}">
+                    <a16:rowId xmlns:a16="http://schemas.microsoft.com/office/drawing/2014/main" val="3839991555"/>
+                  </a:ext>
+                </a:extLst>
+              </a:tr>
+              <a:tr h="370840">
+                <a:tc>
+                  <a:txBody>
+                    <a:bodyPr/>
+                    <a:lstStyle/>
+                    <a:p>
+                      <a:r>
+                        <a:rPr lang="pl-PL" dirty="0" err="1">
+                          <a:latin typeface="Consolas" panose="020B0609020204030204" pitchFamily="49" charset="0"/>
+                          <a:cs typeface="Consolas" panose="020B0609020204030204" pitchFamily="49" charset="0"/>
+                        </a:rPr>
+                        <a:t>unsigned</a:t>
+                      </a:r>
+                      <a:r>
+                        <a:rPr lang="pl-PL" dirty="0">
+                          <a:latin typeface="Consolas" panose="020B0609020204030204" pitchFamily="49" charset="0"/>
+                          <a:cs typeface="Consolas" panose="020B0609020204030204" pitchFamily="49" charset="0"/>
+                        </a:rPr>
+                        <a:t> </a:t>
+                      </a:r>
+                      <a:r>
+                        <a:rPr lang="pl-PL" dirty="0" err="1">
+                          <a:latin typeface="Consolas" panose="020B0609020204030204" pitchFamily="49" charset="0"/>
+                          <a:cs typeface="Consolas" panose="020B0609020204030204" pitchFamily="49" charset="0"/>
+                        </a:rPr>
+                        <a:t>int</a:t>
+                      </a:r>
+                      <a:endParaRPr lang="pl-PL" dirty="0">
+                        <a:latin typeface="Consolas" panose="020B0609020204030204" pitchFamily="49" charset="0"/>
+                        <a:cs typeface="Consolas" panose="020B0609020204030204" pitchFamily="49" charset="0"/>
+                      </a:endParaRPr>
+                    </a:p>
+                  </a:txBody>
+                  <a:tcPr/>
+                </a:tc>
+                <a:tc>
+                  <a:txBody>
+                    <a:bodyPr/>
+                    <a:lstStyle/>
+                    <a:p>
+                      <a:r>
+                        <a:rPr lang="pl-PL" dirty="0">
+                          <a:latin typeface="Consolas" panose="020B0609020204030204" pitchFamily="49" charset="0"/>
+                          <a:cs typeface="Consolas" panose="020B0609020204030204" pitchFamily="49" charset="0"/>
+                        </a:rPr>
+                        <a:t>4</a:t>
+                      </a:r>
+                    </a:p>
+                  </a:txBody>
+                  <a:tcPr/>
+                </a:tc>
+                <a:tc>
+                  <a:txBody>
+                    <a:bodyPr/>
+                    <a:lstStyle/>
+                    <a:p>
+                      <a:pPr marL="0" marR="0" lvl="0" indent="0" algn="l" defTabSz="914400" rtl="0" eaLnBrk="1" fontAlgn="auto" latinLnBrk="0" hangingPunct="1">
+                        <a:lnSpc>
+                          <a:spcPct val="100000"/>
+                        </a:lnSpc>
+                        <a:spcBef>
+                          <a:spcPts val="0"/>
+                        </a:spcBef>
+                        <a:spcAft>
+                          <a:spcPts val="0"/>
+                        </a:spcAft>
+                        <a:buClrTx/>
+                        <a:buSzTx/>
+                        <a:buFontTx/>
+                        <a:buNone/>
+                        <a:tabLst/>
+                        <a:defRPr/>
+                      </a:pPr>
+                      <a:r>
+                        <a:rPr lang="pl-PL" dirty="0">
+                          <a:latin typeface="Consolas" panose="020B0609020204030204" pitchFamily="49" charset="0"/>
+                          <a:cs typeface="Consolas" panose="020B0609020204030204" pitchFamily="49" charset="0"/>
+                        </a:rPr>
+                        <a:t>0</a:t>
+                      </a:r>
+                      <a:r>
+                        <a:rPr lang="pl-PL" baseline="30000" dirty="0">
+                          <a:latin typeface="Consolas" panose="020B0609020204030204" pitchFamily="49" charset="0"/>
+                          <a:cs typeface="Consolas" panose="020B0609020204030204" pitchFamily="49" charset="0"/>
+                        </a:rPr>
+                        <a:t> </a:t>
+                      </a:r>
+                      <a:r>
+                        <a:rPr lang="pl-PL" baseline="0" dirty="0">
+                          <a:latin typeface="Consolas" panose="020B0609020204030204" pitchFamily="49" charset="0"/>
+                          <a:cs typeface="Consolas" panose="020B0609020204030204" pitchFamily="49" charset="0"/>
+                        </a:rPr>
+                        <a:t>-&gt; 2</a:t>
+                      </a:r>
+                      <a:r>
+                        <a:rPr lang="pl-PL" baseline="30000" dirty="0">
+                          <a:latin typeface="Consolas" panose="020B0609020204030204" pitchFamily="49" charset="0"/>
+                          <a:cs typeface="Consolas" panose="020B0609020204030204" pitchFamily="49" charset="0"/>
+                        </a:rPr>
+                        <a:t>32</a:t>
+                      </a:r>
+                      <a:r>
+                        <a:rPr lang="pl-PL" baseline="0" dirty="0">
+                          <a:latin typeface="Consolas" panose="020B0609020204030204" pitchFamily="49" charset="0"/>
+                          <a:cs typeface="Consolas" panose="020B0609020204030204" pitchFamily="49" charset="0"/>
+                        </a:rPr>
+                        <a:t>-1</a:t>
+                      </a:r>
+                      <a:endParaRPr lang="pl-PL" baseline="30000" dirty="0">
+                        <a:latin typeface="Consolas" panose="020B0609020204030204" pitchFamily="49" charset="0"/>
+                        <a:cs typeface="Consolas" panose="020B0609020204030204" pitchFamily="49" charset="0"/>
+                      </a:endParaRPr>
+                    </a:p>
+                  </a:txBody>
+                  <a:tcPr/>
+                </a:tc>
+                <a:extLst>
+                  <a:ext uri="{0D108BD9-81ED-4DB2-BD59-A6C34878D82A}">
+                    <a16:rowId xmlns:a16="http://schemas.microsoft.com/office/drawing/2014/main" val="2271284810"/>
+                  </a:ext>
+                </a:extLst>
+              </a:tr>
+              <a:tr h="370840">
+                <a:tc>
+                  <a:txBody>
+                    <a:bodyPr/>
+                    <a:lstStyle/>
+                    <a:p>
+                      <a:r>
+                        <a:rPr lang="pl-PL" dirty="0" err="1">
+                          <a:latin typeface="Consolas" panose="020B0609020204030204" pitchFamily="49" charset="0"/>
+                          <a:cs typeface="Consolas" panose="020B0609020204030204" pitchFamily="49" charset="0"/>
+                        </a:rPr>
+                        <a:t>unsigned</a:t>
+                      </a:r>
+                      <a:r>
+                        <a:rPr lang="pl-PL" dirty="0">
+                          <a:latin typeface="Consolas" panose="020B0609020204030204" pitchFamily="49" charset="0"/>
+                          <a:cs typeface="Consolas" panose="020B0609020204030204" pitchFamily="49" charset="0"/>
+                        </a:rPr>
+                        <a:t> </a:t>
+                      </a:r>
+                      <a:r>
+                        <a:rPr lang="pl-PL" dirty="0" err="1">
+                          <a:latin typeface="Consolas" panose="020B0609020204030204" pitchFamily="49" charset="0"/>
+                          <a:cs typeface="Consolas" panose="020B0609020204030204" pitchFamily="49" charset="0"/>
+                        </a:rPr>
+                        <a:t>long</a:t>
+                      </a:r>
+                      <a:r>
+                        <a:rPr lang="pl-PL" dirty="0">
+                          <a:latin typeface="Consolas" panose="020B0609020204030204" pitchFamily="49" charset="0"/>
+                          <a:cs typeface="Consolas" panose="020B0609020204030204" pitchFamily="49" charset="0"/>
+                        </a:rPr>
+                        <a:t> </a:t>
+                      </a:r>
+                      <a:r>
+                        <a:rPr lang="pl-PL" dirty="0" err="1">
+                          <a:latin typeface="Consolas" panose="020B0609020204030204" pitchFamily="49" charset="0"/>
+                          <a:cs typeface="Consolas" panose="020B0609020204030204" pitchFamily="49" charset="0"/>
+                        </a:rPr>
+                        <a:t>int</a:t>
+                      </a:r>
+                      <a:endParaRPr lang="pl-PL" dirty="0">
+                        <a:latin typeface="Consolas" panose="020B0609020204030204" pitchFamily="49" charset="0"/>
+                        <a:cs typeface="Consolas" panose="020B0609020204030204" pitchFamily="49" charset="0"/>
+                      </a:endParaRPr>
+                    </a:p>
+                  </a:txBody>
+                  <a:tcPr/>
+                </a:tc>
+                <a:tc>
+                  <a:txBody>
+                    <a:bodyPr/>
+                    <a:lstStyle/>
+                    <a:p>
+                      <a:r>
+                        <a:rPr lang="pl-PL" dirty="0">
+                          <a:latin typeface="Consolas" panose="020B0609020204030204" pitchFamily="49" charset="0"/>
+                          <a:cs typeface="Consolas" panose="020B0609020204030204" pitchFamily="49" charset="0"/>
+                        </a:rPr>
+                        <a:t>4</a:t>
+                      </a:r>
+                    </a:p>
+                  </a:txBody>
+                  <a:tcPr/>
+                </a:tc>
+                <a:tc>
+                  <a:txBody>
+                    <a:bodyPr/>
+                    <a:lstStyle/>
+                    <a:p>
+                      <a:pPr marL="0" marR="0" lvl="0" indent="0" algn="l" defTabSz="914400" rtl="0" eaLnBrk="1" fontAlgn="auto" latinLnBrk="0" hangingPunct="1">
+                        <a:lnSpc>
+                          <a:spcPct val="100000"/>
+                        </a:lnSpc>
+                        <a:spcBef>
+                          <a:spcPts val="0"/>
+                        </a:spcBef>
+                        <a:spcAft>
+                          <a:spcPts val="0"/>
+                        </a:spcAft>
+                        <a:buClrTx/>
+                        <a:buSzTx/>
+                        <a:buFontTx/>
+                        <a:buNone/>
+                        <a:tabLst/>
+                        <a:defRPr/>
+                      </a:pPr>
+                      <a:r>
+                        <a:rPr lang="pl-PL" dirty="0">
+                          <a:latin typeface="Consolas" panose="020B0609020204030204" pitchFamily="49" charset="0"/>
+                          <a:cs typeface="Consolas" panose="020B0609020204030204" pitchFamily="49" charset="0"/>
+                        </a:rPr>
+                        <a:t>0</a:t>
+                      </a:r>
+                      <a:r>
+                        <a:rPr lang="pl-PL" baseline="30000" dirty="0">
+                          <a:latin typeface="Consolas" panose="020B0609020204030204" pitchFamily="49" charset="0"/>
+                          <a:cs typeface="Consolas" panose="020B0609020204030204" pitchFamily="49" charset="0"/>
+                        </a:rPr>
+                        <a:t> </a:t>
+                      </a:r>
+                      <a:r>
+                        <a:rPr lang="pl-PL" baseline="0" dirty="0">
+                          <a:latin typeface="Consolas" panose="020B0609020204030204" pitchFamily="49" charset="0"/>
+                          <a:cs typeface="Consolas" panose="020B0609020204030204" pitchFamily="49" charset="0"/>
+                        </a:rPr>
+                        <a:t>-&gt; 2</a:t>
+                      </a:r>
+                      <a:r>
+                        <a:rPr lang="pl-PL" baseline="30000" dirty="0">
+                          <a:latin typeface="Consolas" panose="020B0609020204030204" pitchFamily="49" charset="0"/>
+                          <a:cs typeface="Consolas" panose="020B0609020204030204" pitchFamily="49" charset="0"/>
+                        </a:rPr>
+                        <a:t>32</a:t>
+                      </a:r>
+                      <a:r>
+                        <a:rPr lang="pl-PL" baseline="0" dirty="0">
+                          <a:latin typeface="Consolas" panose="020B0609020204030204" pitchFamily="49" charset="0"/>
+                          <a:cs typeface="Consolas" panose="020B0609020204030204" pitchFamily="49" charset="0"/>
+                        </a:rPr>
+                        <a:t>-1</a:t>
+                      </a:r>
+                      <a:endParaRPr lang="pl-PL" baseline="30000" dirty="0">
+                        <a:latin typeface="Consolas" panose="020B0609020204030204" pitchFamily="49" charset="0"/>
+                        <a:cs typeface="Consolas" panose="020B0609020204030204" pitchFamily="49" charset="0"/>
+                      </a:endParaRPr>
+                    </a:p>
+                  </a:txBody>
+                  <a:tcPr/>
+                </a:tc>
+                <a:extLst>
+                  <a:ext uri="{0D108BD9-81ED-4DB2-BD59-A6C34878D82A}">
+                    <a16:rowId xmlns:a16="http://schemas.microsoft.com/office/drawing/2014/main" val="3356667780"/>
+                  </a:ext>
+                </a:extLst>
+              </a:tr>
+              <a:tr h="0">
+                <a:tc>
+                  <a:txBody>
+                    <a:bodyPr/>
+                    <a:lstStyle/>
+                    <a:p>
+                      <a:r>
+                        <a:rPr lang="pl-PL" dirty="0" err="1">
+                          <a:latin typeface="Consolas" panose="020B0609020204030204" pitchFamily="49" charset="0"/>
+                          <a:cs typeface="Consolas" panose="020B0609020204030204" pitchFamily="49" charset="0"/>
+                        </a:rPr>
+                        <a:t>unsigned</a:t>
+                      </a:r>
+                      <a:r>
+                        <a:rPr lang="pl-PL" dirty="0">
+                          <a:latin typeface="Consolas" panose="020B0609020204030204" pitchFamily="49" charset="0"/>
+                          <a:cs typeface="Consolas" panose="020B0609020204030204" pitchFamily="49" charset="0"/>
+                        </a:rPr>
+                        <a:t> </a:t>
+                      </a:r>
+                      <a:r>
+                        <a:rPr lang="pl-PL" dirty="0" err="1">
+                          <a:latin typeface="Consolas" panose="020B0609020204030204" pitchFamily="49" charset="0"/>
+                          <a:cs typeface="Consolas" panose="020B0609020204030204" pitchFamily="49" charset="0"/>
+                        </a:rPr>
+                        <a:t>long</a:t>
+                      </a:r>
+                      <a:r>
+                        <a:rPr lang="pl-PL" dirty="0">
+                          <a:latin typeface="Consolas" panose="020B0609020204030204" pitchFamily="49" charset="0"/>
+                          <a:cs typeface="Consolas" panose="020B0609020204030204" pitchFamily="49" charset="0"/>
+                        </a:rPr>
+                        <a:t> </a:t>
+                      </a:r>
+                      <a:r>
+                        <a:rPr lang="pl-PL" dirty="0" err="1">
+                          <a:latin typeface="Consolas" panose="020B0609020204030204" pitchFamily="49" charset="0"/>
+                          <a:cs typeface="Consolas" panose="020B0609020204030204" pitchFamily="49" charset="0"/>
+                        </a:rPr>
+                        <a:t>long</a:t>
+                      </a:r>
+                      <a:r>
+                        <a:rPr lang="pl-PL" dirty="0">
+                          <a:latin typeface="Consolas" panose="020B0609020204030204" pitchFamily="49" charset="0"/>
+                          <a:cs typeface="Consolas" panose="020B0609020204030204" pitchFamily="49" charset="0"/>
+                        </a:rPr>
+                        <a:t> </a:t>
+                      </a:r>
+                      <a:r>
+                        <a:rPr lang="pl-PL" dirty="0" err="1">
+                          <a:latin typeface="Consolas" panose="020B0609020204030204" pitchFamily="49" charset="0"/>
+                          <a:cs typeface="Consolas" panose="020B0609020204030204" pitchFamily="49" charset="0"/>
+                        </a:rPr>
+                        <a:t>int</a:t>
+                      </a:r>
+                      <a:endParaRPr lang="pl-PL" dirty="0">
+                        <a:latin typeface="Consolas" panose="020B0609020204030204" pitchFamily="49" charset="0"/>
+                        <a:cs typeface="Consolas" panose="020B0609020204030204" pitchFamily="49" charset="0"/>
+                      </a:endParaRPr>
+                    </a:p>
+                  </a:txBody>
+                  <a:tcPr/>
+                </a:tc>
+                <a:tc>
+                  <a:txBody>
+                    <a:bodyPr/>
+                    <a:lstStyle/>
+                    <a:p>
+                      <a:r>
+                        <a:rPr lang="pl-PL" dirty="0">
+                          <a:latin typeface="Consolas" panose="020B0609020204030204" pitchFamily="49" charset="0"/>
+                          <a:cs typeface="Consolas" panose="020B0609020204030204" pitchFamily="49" charset="0"/>
+                        </a:rPr>
+                        <a:t>8</a:t>
+                      </a:r>
+                    </a:p>
+                  </a:txBody>
+                  <a:tcPr/>
+                </a:tc>
+                <a:tc>
+                  <a:txBody>
+                    <a:bodyPr/>
+                    <a:lstStyle/>
+                    <a:p>
+                      <a:pPr marL="0" marR="0" lvl="0" indent="0" algn="l" defTabSz="914400" rtl="0" eaLnBrk="1" fontAlgn="auto" latinLnBrk="0" hangingPunct="1">
+                        <a:lnSpc>
+                          <a:spcPct val="100000"/>
+                        </a:lnSpc>
+                        <a:spcBef>
+                          <a:spcPts val="0"/>
+                        </a:spcBef>
+                        <a:spcAft>
+                          <a:spcPts val="0"/>
+                        </a:spcAft>
+                        <a:buClrTx/>
+                        <a:buSzTx/>
+                        <a:buFontTx/>
+                        <a:buNone/>
+                        <a:tabLst/>
+                        <a:defRPr/>
+                      </a:pPr>
+                      <a:r>
+                        <a:rPr lang="pl-PL" dirty="0">
+                          <a:latin typeface="Consolas" panose="020B0609020204030204" pitchFamily="49" charset="0"/>
+                          <a:cs typeface="Consolas" panose="020B0609020204030204" pitchFamily="49" charset="0"/>
+                        </a:rPr>
+                        <a:t>0</a:t>
+                      </a:r>
+                      <a:r>
+                        <a:rPr lang="pl-PL" baseline="30000" dirty="0">
+                          <a:latin typeface="Consolas" panose="020B0609020204030204" pitchFamily="49" charset="0"/>
+                          <a:cs typeface="Consolas" panose="020B0609020204030204" pitchFamily="49" charset="0"/>
+                        </a:rPr>
+                        <a:t> </a:t>
+                      </a:r>
+                      <a:r>
+                        <a:rPr lang="pl-PL" baseline="0" dirty="0">
+                          <a:latin typeface="Consolas" panose="020B0609020204030204" pitchFamily="49" charset="0"/>
+                          <a:cs typeface="Consolas" panose="020B0609020204030204" pitchFamily="49" charset="0"/>
+                        </a:rPr>
+                        <a:t>-&gt; 2</a:t>
+                      </a:r>
+                      <a:r>
+                        <a:rPr lang="pl-PL" baseline="30000" dirty="0">
+                          <a:latin typeface="Consolas" panose="020B0609020204030204" pitchFamily="49" charset="0"/>
+                          <a:cs typeface="Consolas" panose="020B0609020204030204" pitchFamily="49" charset="0"/>
+                        </a:rPr>
+                        <a:t>64</a:t>
+                      </a:r>
+                      <a:r>
+                        <a:rPr lang="pl-PL" baseline="0" dirty="0">
+                          <a:latin typeface="Consolas" panose="020B0609020204030204" pitchFamily="49" charset="0"/>
+                          <a:cs typeface="Consolas" panose="020B0609020204030204" pitchFamily="49" charset="0"/>
+                        </a:rPr>
+                        <a:t>-1</a:t>
+                      </a:r>
+                      <a:endParaRPr lang="pl-PL" baseline="30000" dirty="0">
+                        <a:latin typeface="Consolas" panose="020B0609020204030204" pitchFamily="49" charset="0"/>
+                        <a:cs typeface="Consolas" panose="020B0609020204030204" pitchFamily="49" charset="0"/>
+                      </a:endParaRPr>
+                    </a:p>
+                  </a:txBody>
+                  <a:tcPr/>
+                </a:tc>
+                <a:extLst>
+                  <a:ext uri="{0D108BD9-81ED-4DB2-BD59-A6C34878D82A}">
+                    <a16:rowId xmlns:a16="http://schemas.microsoft.com/office/drawing/2014/main" val="802727580"/>
+                  </a:ext>
+                </a:extLst>
+              </a:tr>
+            </a:tbl>
+          </a:graphicData>
+        </a:graphic>
+      </p:graphicFrame>
     </p:spTree>
     <p:extLst>
       <p:ext uri="{BB962C8B-B14F-4D97-AF65-F5344CB8AC3E}">
-        <p14:creationId xmlns:p14="http://schemas.microsoft.com/office/powerpoint/2010/main" val="241673532"/>
+        <p14:creationId xmlns:p14="http://schemas.microsoft.com/office/powerpoint/2010/main" val="2927876536"/>
       </p:ext>
     </p:extLst>
   </p:cSld>
@@ -4148,7 +5066,13 @@
       </p:grpSpPr>
       <p:sp>
         <p:nvSpPr>
-          <p:cNvPr id="2" name="Tytuł 1"/>
+          <p:cNvPr id="2" name="Tytuł 1">
+            <a:extLst>
+              <a:ext uri="{FF2B5EF4-FFF2-40B4-BE49-F238E27FC236}">
+                <a16:creationId xmlns:a16="http://schemas.microsoft.com/office/drawing/2014/main" id="{B2B4EF50-E6D5-4140-8563-56724B3BE24E}"/>
+              </a:ext>
+            </a:extLst>
+          </p:cNvPr>
           <p:cNvSpPr>
             <a:spLocks noGrp="1"/>
           </p:cNvSpPr>
@@ -4163,56 +5087,354 @@
           <a:p>
             <a:r>
               <a:rPr lang="pl-PL" dirty="0"/>
-              <a:t>Znaki</a:t>
-            </a:r>
-          </a:p>
-        </p:txBody>
-      </p:sp>
-      <p:sp>
-        <p:nvSpPr>
-          <p:cNvPr id="3" name="Symbol zastępczy zawartości 2"/>
-          <p:cNvSpPr>
-            <a:spLocks noGrp="1"/>
-          </p:cNvSpPr>
+              <a:t>Liczby rzeczywiste</a:t>
+            </a:r>
+          </a:p>
+        </p:txBody>
+      </p:sp>
+      <p:graphicFrame>
+        <p:nvGraphicFramePr>
+          <p:cNvPr id="5" name="Symbol zastępczy zawartości 4">
+            <a:extLst>
+              <a:ext uri="{FF2B5EF4-FFF2-40B4-BE49-F238E27FC236}">
+                <a16:creationId xmlns:a16="http://schemas.microsoft.com/office/drawing/2014/main" id="{8BD5AEE0-4BE5-5743-9B44-7A1D05C851F5}"/>
+              </a:ext>
+            </a:extLst>
+          </p:cNvPr>
+          <p:cNvGraphicFramePr>
+            <a:graphicFrameLocks noGrp="1"/>
+          </p:cNvGraphicFramePr>
           <p:nvPr>
             <p:ph idx="1"/>
-          </p:nvPr>
-        </p:nvSpPr>
-        <p:spPr/>
-        <p:txBody>
-          <a:bodyPr/>
-          <a:lstStyle/>
-          <a:p>
-            <a:r>
-              <a:rPr lang="pl-PL" dirty="0">
-                <a:latin typeface="Consolas" panose="020B0609020204030204" pitchFamily="49" charset="0"/>
-                <a:cs typeface="Consolas" panose="020B0609020204030204" pitchFamily="49" charset="0"/>
-              </a:rPr>
-              <a:t>char</a:t>
-            </a:r>
-          </a:p>
-          <a:p>
-            <a:r>
-              <a:rPr lang="pl-PL" dirty="0" err="1">
-                <a:latin typeface="Consolas" panose="020B0609020204030204" pitchFamily="49" charset="0"/>
-                <a:cs typeface="Consolas" panose="020B0609020204030204" pitchFamily="49" charset="0"/>
-              </a:rPr>
-              <a:t>unsigned</a:t>
-            </a:r>
-            <a:r>
-              <a:rPr lang="pl-PL" dirty="0">
-                <a:latin typeface="Consolas" panose="020B0609020204030204" pitchFamily="49" charset="0"/>
-                <a:cs typeface="Consolas" panose="020B0609020204030204" pitchFamily="49" charset="0"/>
-              </a:rPr>
-              <a:t> char</a:t>
-            </a:r>
-          </a:p>
-        </p:txBody>
-      </p:sp>
+            <p:extLst>
+              <p:ext uri="{D42A27DB-BD31-4B8C-83A1-F6EECF244321}">
+                <p14:modId xmlns:p14="http://schemas.microsoft.com/office/powerpoint/2010/main" val="2216871885"/>
+              </p:ext>
+            </p:extLst>
+          </p:nvPr>
+        </p:nvGraphicFramePr>
+        <p:xfrm>
+          <a:off x="838200" y="1825625"/>
+          <a:ext cx="10515600" cy="1483360"/>
+        </p:xfrm>
+        <a:graphic>
+          <a:graphicData uri="http://schemas.openxmlformats.org/drawingml/2006/table">
+            <a:tbl>
+              <a:tblPr firstRow="1" bandRow="1">
+                <a:tableStyleId>{5C22544A-7EE6-4342-B048-85BDC9FD1C3A}</a:tableStyleId>
+              </a:tblPr>
+              <a:tblGrid>
+                <a:gridCol w="3505200">
+                  <a:extLst>
+                    <a:ext uri="{9D8B030D-6E8A-4147-A177-3AD203B41FA5}">
+                      <a16:colId xmlns:a16="http://schemas.microsoft.com/office/drawing/2014/main" val="331973627"/>
+                    </a:ext>
+                  </a:extLst>
+                </a:gridCol>
+                <a:gridCol w="2425390">
+                  <a:extLst>
+                    <a:ext uri="{9D8B030D-6E8A-4147-A177-3AD203B41FA5}">
+                      <a16:colId xmlns:a16="http://schemas.microsoft.com/office/drawing/2014/main" val="1788878907"/>
+                    </a:ext>
+                  </a:extLst>
+                </a:gridCol>
+                <a:gridCol w="4585010">
+                  <a:extLst>
+                    <a:ext uri="{9D8B030D-6E8A-4147-A177-3AD203B41FA5}">
+                      <a16:colId xmlns:a16="http://schemas.microsoft.com/office/drawing/2014/main" val="2810744997"/>
+                    </a:ext>
+                  </a:extLst>
+                </a:gridCol>
+              </a:tblGrid>
+              <a:tr h="370840">
+                <a:tc>
+                  <a:txBody>
+                    <a:bodyPr/>
+                    <a:lstStyle/>
+                    <a:p>
+                      <a:r>
+                        <a:rPr lang="pl-PL" dirty="0"/>
+                        <a:t>Typ</a:t>
+                      </a:r>
+                    </a:p>
+                  </a:txBody>
+                  <a:tcPr/>
+                </a:tc>
+                <a:tc>
+                  <a:txBody>
+                    <a:bodyPr/>
+                    <a:lstStyle/>
+                    <a:p>
+                      <a:r>
+                        <a:rPr lang="pl-PL" dirty="0"/>
+                        <a:t>Ilość bajtów</a:t>
+                      </a:r>
+                    </a:p>
+                  </a:txBody>
+                  <a:tcPr/>
+                </a:tc>
+                <a:tc>
+                  <a:txBody>
+                    <a:bodyPr/>
+                    <a:lstStyle/>
+                    <a:p>
+                      <a:r>
+                        <a:rPr lang="pl-PL" dirty="0"/>
+                        <a:t>Zakres</a:t>
+                      </a:r>
+                    </a:p>
+                  </a:txBody>
+                  <a:tcPr/>
+                </a:tc>
+                <a:extLst>
+                  <a:ext uri="{0D108BD9-81ED-4DB2-BD59-A6C34878D82A}">
+                    <a16:rowId xmlns:a16="http://schemas.microsoft.com/office/drawing/2014/main" val="1663831127"/>
+                  </a:ext>
+                </a:extLst>
+              </a:tr>
+              <a:tr h="370840">
+                <a:tc>
+                  <a:txBody>
+                    <a:bodyPr/>
+                    <a:lstStyle/>
+                    <a:p>
+                      <a:r>
+                        <a:rPr lang="pl-PL" dirty="0" err="1">
+                          <a:latin typeface="Consolas" panose="020B0609020204030204" pitchFamily="49" charset="0"/>
+                          <a:cs typeface="Consolas" panose="020B0609020204030204" pitchFamily="49" charset="0"/>
+                        </a:rPr>
+                        <a:t>float</a:t>
+                      </a:r>
+                      <a:endParaRPr lang="pl-PL" dirty="0">
+                        <a:latin typeface="Consolas" panose="020B0609020204030204" pitchFamily="49" charset="0"/>
+                        <a:cs typeface="Consolas" panose="020B0609020204030204" pitchFamily="49" charset="0"/>
+                      </a:endParaRPr>
+                    </a:p>
+                  </a:txBody>
+                  <a:tcPr/>
+                </a:tc>
+                <a:tc>
+                  <a:txBody>
+                    <a:bodyPr/>
+                    <a:lstStyle/>
+                    <a:p>
+                      <a:r>
+                        <a:rPr lang="pl-PL" dirty="0">
+                          <a:latin typeface="Consolas" panose="020B0609020204030204" pitchFamily="49" charset="0"/>
+                          <a:cs typeface="Consolas" panose="020B0609020204030204" pitchFamily="49" charset="0"/>
+                        </a:rPr>
+                        <a:t>4</a:t>
+                      </a:r>
+                    </a:p>
+                  </a:txBody>
+                  <a:tcPr/>
+                </a:tc>
+                <a:tc>
+                  <a:txBody>
+                    <a:bodyPr/>
+                    <a:lstStyle/>
+                    <a:p>
+                      <a:pPr marL="0" marR="0" lvl="0" indent="0" algn="l" defTabSz="914400" rtl="0" eaLnBrk="1" fontAlgn="auto" latinLnBrk="0" hangingPunct="1">
+                        <a:lnSpc>
+                          <a:spcPct val="100000"/>
+                        </a:lnSpc>
+                        <a:spcBef>
+                          <a:spcPts val="0"/>
+                        </a:spcBef>
+                        <a:spcAft>
+                          <a:spcPts val="0"/>
+                        </a:spcAft>
+                        <a:buClrTx/>
+                        <a:buSzTx/>
+                        <a:buFontTx/>
+                        <a:buNone/>
+                        <a:tabLst/>
+                        <a:defRPr/>
+                      </a:pPr>
+                      <a:r>
+                        <a:rPr lang="pl-PL" sz="1800" b="0" i="0" kern="1200" dirty="0">
+                          <a:solidFill>
+                            <a:schemeClr val="dk1"/>
+                          </a:solidFill>
+                          <a:effectLst/>
+                          <a:latin typeface="Consolas" panose="020B0609020204030204" pitchFamily="49" charset="0"/>
+                          <a:ea typeface="+mn-ea"/>
+                          <a:cs typeface="Consolas" panose="020B0609020204030204" pitchFamily="49" charset="0"/>
+                        </a:rPr>
+                        <a:t>+/- 3.4e +/- 38 (~7 znaków)</a:t>
+                      </a:r>
+                      <a:endParaRPr lang="pl-PL" baseline="30000" dirty="0">
+                        <a:latin typeface="Consolas" panose="020B0609020204030204" pitchFamily="49" charset="0"/>
+                        <a:cs typeface="Consolas" panose="020B0609020204030204" pitchFamily="49" charset="0"/>
+                      </a:endParaRPr>
+                    </a:p>
+                  </a:txBody>
+                  <a:tcPr/>
+                </a:tc>
+                <a:extLst>
+                  <a:ext uri="{0D108BD9-81ED-4DB2-BD59-A6C34878D82A}">
+                    <a16:rowId xmlns:a16="http://schemas.microsoft.com/office/drawing/2014/main" val="2915682256"/>
+                  </a:ext>
+                </a:extLst>
+              </a:tr>
+              <a:tr h="370840">
+                <a:tc>
+                  <a:txBody>
+                    <a:bodyPr/>
+                    <a:lstStyle/>
+                    <a:p>
+                      <a:r>
+                        <a:rPr lang="pl-PL" dirty="0" err="1">
+                          <a:latin typeface="Consolas" panose="020B0609020204030204" pitchFamily="49" charset="0"/>
+                          <a:cs typeface="Consolas" panose="020B0609020204030204" pitchFamily="49" charset="0"/>
+                        </a:rPr>
+                        <a:t>double</a:t>
+                      </a:r>
+                      <a:endParaRPr lang="pl-PL" dirty="0">
+                        <a:latin typeface="Consolas" panose="020B0609020204030204" pitchFamily="49" charset="0"/>
+                        <a:cs typeface="Consolas" panose="020B0609020204030204" pitchFamily="49" charset="0"/>
+                      </a:endParaRPr>
+                    </a:p>
+                  </a:txBody>
+                  <a:tcPr/>
+                </a:tc>
+                <a:tc>
+                  <a:txBody>
+                    <a:bodyPr/>
+                    <a:lstStyle/>
+                    <a:p>
+                      <a:r>
+                        <a:rPr lang="pl-PL" dirty="0">
+                          <a:latin typeface="Consolas" panose="020B0609020204030204" pitchFamily="49" charset="0"/>
+                          <a:cs typeface="Consolas" panose="020B0609020204030204" pitchFamily="49" charset="0"/>
+                        </a:rPr>
+                        <a:t>8</a:t>
+                      </a:r>
+                    </a:p>
+                  </a:txBody>
+                  <a:tcPr/>
+                </a:tc>
+                <a:tc>
+                  <a:txBody>
+                    <a:bodyPr/>
+                    <a:lstStyle/>
+                    <a:p>
+                      <a:r>
+                        <a:rPr lang="pl-PL" sz="1800" b="0" i="0" kern="1200" dirty="0">
+                          <a:solidFill>
+                            <a:schemeClr val="dk1"/>
+                          </a:solidFill>
+                          <a:effectLst/>
+                          <a:latin typeface="Consolas" panose="020B0609020204030204" pitchFamily="49" charset="0"/>
+                          <a:ea typeface="+mn-ea"/>
+                          <a:cs typeface="Consolas" panose="020B0609020204030204" pitchFamily="49" charset="0"/>
+                        </a:rPr>
+                        <a:t>+/- 1.7e +/- 308 (~15 znaków)</a:t>
+                      </a:r>
+                      <a:endParaRPr lang="pl-PL" baseline="30000" dirty="0">
+                        <a:latin typeface="Consolas" panose="020B0609020204030204" pitchFamily="49" charset="0"/>
+                        <a:cs typeface="Consolas" panose="020B0609020204030204" pitchFamily="49" charset="0"/>
+                      </a:endParaRPr>
+                    </a:p>
+                  </a:txBody>
+                  <a:tcPr/>
+                </a:tc>
+                <a:extLst>
+                  <a:ext uri="{0D108BD9-81ED-4DB2-BD59-A6C34878D82A}">
+                    <a16:rowId xmlns:a16="http://schemas.microsoft.com/office/drawing/2014/main" val="287385622"/>
+                  </a:ext>
+                </a:extLst>
+              </a:tr>
+              <a:tr h="370840">
+                <a:tc>
+                  <a:txBody>
+                    <a:bodyPr/>
+                    <a:lstStyle/>
+                    <a:p>
+                      <a:r>
+                        <a:rPr lang="pl-PL" dirty="0" err="1">
+                          <a:latin typeface="Consolas" panose="020B0609020204030204" pitchFamily="49" charset="0"/>
+                          <a:cs typeface="Consolas" panose="020B0609020204030204" pitchFamily="49" charset="0"/>
+                        </a:rPr>
+                        <a:t>long</a:t>
+                      </a:r>
+                      <a:r>
+                        <a:rPr lang="pl-PL" dirty="0">
+                          <a:latin typeface="Consolas" panose="020B0609020204030204" pitchFamily="49" charset="0"/>
+                          <a:cs typeface="Consolas" panose="020B0609020204030204" pitchFamily="49" charset="0"/>
+                        </a:rPr>
+                        <a:t> </a:t>
+                      </a:r>
+                      <a:r>
+                        <a:rPr lang="pl-PL" dirty="0" err="1">
+                          <a:latin typeface="Consolas" panose="020B0609020204030204" pitchFamily="49" charset="0"/>
+                          <a:cs typeface="Consolas" panose="020B0609020204030204" pitchFamily="49" charset="0"/>
+                        </a:rPr>
+                        <a:t>double</a:t>
+                      </a:r>
+                      <a:endParaRPr lang="pl-PL" dirty="0">
+                        <a:latin typeface="Consolas" panose="020B0609020204030204" pitchFamily="49" charset="0"/>
+                        <a:cs typeface="Consolas" panose="020B0609020204030204" pitchFamily="49" charset="0"/>
+                      </a:endParaRPr>
+                    </a:p>
+                  </a:txBody>
+                  <a:tcPr/>
+                </a:tc>
+                <a:tc>
+                  <a:txBody>
+                    <a:bodyPr/>
+                    <a:lstStyle/>
+                    <a:p>
+                      <a:r>
+                        <a:rPr lang="pl-PL" dirty="0">
+                          <a:latin typeface="Consolas" panose="020B0609020204030204" pitchFamily="49" charset="0"/>
+                          <a:cs typeface="Consolas" panose="020B0609020204030204" pitchFamily="49" charset="0"/>
+                        </a:rPr>
+                        <a:t>8</a:t>
+                      </a:r>
+                    </a:p>
+                  </a:txBody>
+                  <a:tcPr/>
+                </a:tc>
+                <a:tc>
+                  <a:txBody>
+                    <a:bodyPr/>
+                    <a:lstStyle/>
+                    <a:p>
+                      <a:r>
+                        <a:rPr lang="pl-PL" sz="1800" b="0" i="0" kern="1200" dirty="0">
+                          <a:solidFill>
+                            <a:schemeClr val="dk1"/>
+                          </a:solidFill>
+                          <a:effectLst/>
+                          <a:latin typeface="Consolas" panose="020B0609020204030204" pitchFamily="49" charset="0"/>
+                          <a:ea typeface="+mn-ea"/>
+                          <a:cs typeface="Consolas" panose="020B0609020204030204" pitchFamily="49" charset="0"/>
+                        </a:rPr>
+                        <a:t>+/- 1.7e +/- 308 (~15 znaków)</a:t>
+                      </a:r>
+                      <a:endParaRPr lang="pl-PL" baseline="30000" dirty="0">
+                        <a:latin typeface="Consolas" panose="020B0609020204030204" pitchFamily="49" charset="0"/>
+                        <a:cs typeface="Consolas" panose="020B0609020204030204" pitchFamily="49" charset="0"/>
+                      </a:endParaRPr>
+                    </a:p>
+                  </a:txBody>
+                  <a:tcPr/>
+                </a:tc>
+                <a:extLst>
+                  <a:ext uri="{0D108BD9-81ED-4DB2-BD59-A6C34878D82A}">
+                    <a16:rowId xmlns:a16="http://schemas.microsoft.com/office/drawing/2014/main" val="3248532885"/>
+                  </a:ext>
+                </a:extLst>
+              </a:tr>
+            </a:tbl>
+          </a:graphicData>
+        </a:graphic>
+      </p:graphicFrame>
     </p:spTree>
     <p:extLst>
       <p:ext uri="{BB962C8B-B14F-4D97-AF65-F5344CB8AC3E}">
-        <p14:creationId xmlns:p14="http://schemas.microsoft.com/office/powerpoint/2010/main" val="559503361"/>
+        <p14:creationId xmlns:p14="http://schemas.microsoft.com/office/powerpoint/2010/main" val="2779814817"/>
       </p:ext>
     </p:extLst>
   </p:cSld>
@@ -4256,7 +5478,7 @@
           <a:p>
             <a:r>
               <a:rPr lang="pl-PL" dirty="0"/>
-              <a:t>Ciągi znaków</a:t>
+              <a:t>Znaki</a:t>
             </a:r>
           </a:p>
         </p:txBody>
@@ -4281,7 +5503,23 @@
                 <a:latin typeface="Consolas" panose="020B0609020204030204" pitchFamily="49" charset="0"/>
                 <a:cs typeface="Consolas" panose="020B0609020204030204" pitchFamily="49" charset="0"/>
               </a:rPr>
-              <a:t>string</a:t>
+              <a:t>char</a:t>
+            </a:r>
+          </a:p>
+          <a:p>
+            <a:r>
+              <a:rPr lang="pl-PL" dirty="0" err="1">
+                <a:latin typeface="Consolas" panose="020B0609020204030204" pitchFamily="49" charset="0"/>
+                <a:cs typeface="Consolas" panose="020B0609020204030204" pitchFamily="49" charset="0"/>
+              </a:rPr>
+              <a:t>unsigned</a:t>
+            </a:r>
+            <a:r>
+              <a:rPr lang="pl-PL" dirty="0">
+                <a:latin typeface="Consolas" panose="020B0609020204030204" pitchFamily="49" charset="0"/>
+                <a:cs typeface="Consolas" panose="020B0609020204030204" pitchFamily="49" charset="0"/>
+              </a:rPr>
+              <a:t> char</a:t>
             </a:r>
           </a:p>
         </p:txBody>
@@ -4289,7 +5527,7 @@
     </p:spTree>
     <p:extLst>
       <p:ext uri="{BB962C8B-B14F-4D97-AF65-F5344CB8AC3E}">
-        <p14:creationId xmlns:p14="http://schemas.microsoft.com/office/powerpoint/2010/main" val="1443950392"/>
+        <p14:creationId xmlns:p14="http://schemas.microsoft.com/office/powerpoint/2010/main" val="559503361"/>
       </p:ext>
     </p:extLst>
   </p:cSld>
@@ -4333,7 +5571,7 @@
           <a:p>
             <a:r>
               <a:rPr lang="pl-PL" dirty="0"/>
-              <a:t>Typ boolowski</a:t>
+              <a:t>Ciągi znaków</a:t>
             </a:r>
           </a:p>
         </p:txBody>
@@ -4354,23 +5592,19 @@
           <a:lstStyle/>
           <a:p>
             <a:r>
-              <a:rPr lang="pl-PL" dirty="0" err="1">
+              <a:rPr lang="pl-PL" dirty="0">
                 <a:latin typeface="Consolas" panose="020B0609020204030204" pitchFamily="49" charset="0"/>
                 <a:cs typeface="Consolas" panose="020B0609020204030204" pitchFamily="49" charset="0"/>
               </a:rPr>
-              <a:t>bool</a:t>
-            </a:r>
-            <a:endParaRPr lang="pl-PL" dirty="0">
-              <a:latin typeface="Consolas" panose="020B0609020204030204" pitchFamily="49" charset="0"/>
-              <a:cs typeface="Consolas" panose="020B0609020204030204" pitchFamily="49" charset="0"/>
-            </a:endParaRPr>
+              <a:t>string</a:t>
+            </a:r>
           </a:p>
         </p:txBody>
       </p:sp>
     </p:spTree>
     <p:extLst>
       <p:ext uri="{BB962C8B-B14F-4D97-AF65-F5344CB8AC3E}">
-        <p14:creationId xmlns:p14="http://schemas.microsoft.com/office/powerpoint/2010/main" val="552689025"/>
+        <p14:creationId xmlns:p14="http://schemas.microsoft.com/office/powerpoint/2010/main" val="1443950392"/>
       </p:ext>
     </p:extLst>
   </p:cSld>
@@ -4414,7 +5648,7 @@
           <a:p>
             <a:r>
               <a:rPr lang="pl-PL" dirty="0"/>
-              <a:t>Tworzenie zmiennych</a:t>
+              <a:t>Typ boolowski</a:t>
             </a:r>
           </a:p>
         </p:txBody>
@@ -4434,56 +5668,15 @@
           <a:bodyPr/>
           <a:lstStyle/>
           <a:p>
-            <a:r>
-              <a:rPr lang="pl-PL" dirty="0"/>
-              <a:t>Aby wykorzystać zmienną w programie, musimy ją najpierw utworzyć</a:t>
-            </a:r>
-          </a:p>
-          <a:p>
-            <a:r>
-              <a:rPr lang="pl-PL" dirty="0"/>
-              <a:t>Robimy to w następujący sposób:</a:t>
-            </a:r>
-          </a:p>
-          <a:p>
-            <a:pPr marL="0" indent="0" algn="ctr">
-              <a:buNone/>
-            </a:pPr>
-            <a:r>
-              <a:rPr lang="pl-PL" dirty="0">
-                <a:latin typeface="Consolas" panose="020B0609020204030204" pitchFamily="49" charset="0"/>
-                <a:cs typeface="Consolas" panose="020B0609020204030204" pitchFamily="49" charset="0"/>
-              </a:rPr>
-              <a:t>typ nazwa;</a:t>
-            </a:r>
-          </a:p>
-          <a:p>
-            <a:r>
-              <a:rPr lang="pl-PL" dirty="0"/>
-              <a:t>Np.:</a:t>
-            </a:r>
-          </a:p>
-          <a:p>
-            <a:pPr marL="0" indent="0" algn="ctr">
-              <a:buNone/>
-            </a:pPr>
             <a:r>
               <a:rPr lang="pl-PL" dirty="0" err="1">
                 <a:latin typeface="Consolas" panose="020B0609020204030204" pitchFamily="49" charset="0"/>
                 <a:cs typeface="Consolas" panose="020B0609020204030204" pitchFamily="49" charset="0"/>
               </a:rPr>
-              <a:t>int</a:t>
-            </a:r>
-            <a:r>
-              <a:rPr lang="pl-PL" dirty="0">
-                <a:latin typeface="Consolas" panose="020B0609020204030204" pitchFamily="49" charset="0"/>
-                <a:cs typeface="Consolas" panose="020B0609020204030204" pitchFamily="49" charset="0"/>
-              </a:rPr>
-              <a:t> x;</a:t>
-            </a:r>
-          </a:p>
-          <a:p>
+              <a:t>bool</a:t>
+            </a:r>
             <a:endParaRPr lang="pl-PL" dirty="0">
+              <a:latin typeface="Consolas" panose="020B0609020204030204" pitchFamily="49" charset="0"/>
               <a:cs typeface="Consolas" panose="020B0609020204030204" pitchFamily="49" charset="0"/>
             </a:endParaRPr>
           </a:p>
@@ -4492,7 +5685,7 @@
     </p:spTree>
     <p:extLst>
       <p:ext uri="{BB962C8B-B14F-4D97-AF65-F5344CB8AC3E}">
-        <p14:creationId xmlns:p14="http://schemas.microsoft.com/office/powerpoint/2010/main" val="128022028"/>
+        <p14:creationId xmlns:p14="http://schemas.microsoft.com/office/powerpoint/2010/main" val="552689025"/>
       </p:ext>
     </p:extLst>
   </p:cSld>

</xml_diff>

<commit_message>
Poprawiono błąd w prezentacji
</commit_message>
<xml_diff>
--- a/Programowanie/C++/Zmienne.pptx
+++ b/Programowanie/C++/Zmienne.pptx
@@ -253,7 +253,7 @@
           <a:p>
             <a:fld id="{864D855C-A84D-D148-8ABE-6F03B1DFA2B0}" type="datetimeFigureOut">
               <a:rPr lang="pl-PL" smtClean="0"/>
-              <a:t>16.06.2018</a:t>
+              <a:t>30.10.2020</a:t>
             </a:fld>
             <a:endParaRPr lang="pl-PL"/>
           </a:p>
@@ -421,7 +421,7 @@
           <a:p>
             <a:fld id="{864D855C-A84D-D148-8ABE-6F03B1DFA2B0}" type="datetimeFigureOut">
               <a:rPr lang="pl-PL" smtClean="0"/>
-              <a:t>16.06.2018</a:t>
+              <a:t>30.10.2020</a:t>
             </a:fld>
             <a:endParaRPr lang="pl-PL"/>
           </a:p>
@@ -599,7 +599,7 @@
           <a:p>
             <a:fld id="{864D855C-A84D-D148-8ABE-6F03B1DFA2B0}" type="datetimeFigureOut">
               <a:rPr lang="pl-PL" smtClean="0"/>
-              <a:t>16.06.2018</a:t>
+              <a:t>30.10.2020</a:t>
             </a:fld>
             <a:endParaRPr lang="pl-PL"/>
           </a:p>
@@ -767,7 +767,7 @@
           <a:p>
             <a:fld id="{864D855C-A84D-D148-8ABE-6F03B1DFA2B0}" type="datetimeFigureOut">
               <a:rPr lang="pl-PL" smtClean="0"/>
-              <a:t>16.06.2018</a:t>
+              <a:t>30.10.2020</a:t>
             </a:fld>
             <a:endParaRPr lang="pl-PL"/>
           </a:p>
@@ -1012,7 +1012,7 @@
           <a:p>
             <a:fld id="{864D855C-A84D-D148-8ABE-6F03B1DFA2B0}" type="datetimeFigureOut">
               <a:rPr lang="pl-PL" smtClean="0"/>
-              <a:t>16.06.2018</a:t>
+              <a:t>30.10.2020</a:t>
             </a:fld>
             <a:endParaRPr lang="pl-PL"/>
           </a:p>
@@ -1241,7 +1241,7 @@
           <a:p>
             <a:fld id="{864D855C-A84D-D148-8ABE-6F03B1DFA2B0}" type="datetimeFigureOut">
               <a:rPr lang="pl-PL" smtClean="0"/>
-              <a:t>16.06.2018</a:t>
+              <a:t>30.10.2020</a:t>
             </a:fld>
             <a:endParaRPr lang="pl-PL"/>
           </a:p>
@@ -1605,7 +1605,7 @@
           <a:p>
             <a:fld id="{864D855C-A84D-D148-8ABE-6F03B1DFA2B0}" type="datetimeFigureOut">
               <a:rPr lang="pl-PL" smtClean="0"/>
-              <a:t>16.06.2018</a:t>
+              <a:t>30.10.2020</a:t>
             </a:fld>
             <a:endParaRPr lang="pl-PL"/>
           </a:p>
@@ -1722,7 +1722,7 @@
           <a:p>
             <a:fld id="{864D855C-A84D-D148-8ABE-6F03B1DFA2B0}" type="datetimeFigureOut">
               <a:rPr lang="pl-PL" smtClean="0"/>
-              <a:t>16.06.2018</a:t>
+              <a:t>30.10.2020</a:t>
             </a:fld>
             <a:endParaRPr lang="pl-PL"/>
           </a:p>
@@ -1817,7 +1817,7 @@
           <a:p>
             <a:fld id="{864D855C-A84D-D148-8ABE-6F03B1DFA2B0}" type="datetimeFigureOut">
               <a:rPr lang="pl-PL" smtClean="0"/>
-              <a:t>16.06.2018</a:t>
+              <a:t>30.10.2020</a:t>
             </a:fld>
             <a:endParaRPr lang="pl-PL"/>
           </a:p>
@@ -2092,7 +2092,7 @@
           <a:p>
             <a:fld id="{864D855C-A84D-D148-8ABE-6F03B1DFA2B0}" type="datetimeFigureOut">
               <a:rPr lang="pl-PL" smtClean="0"/>
-              <a:t>16.06.2018</a:t>
+              <a:t>30.10.2020</a:t>
             </a:fld>
             <a:endParaRPr lang="pl-PL"/>
           </a:p>
@@ -2344,7 +2344,7 @@
           <a:p>
             <a:fld id="{864D855C-A84D-D148-8ABE-6F03B1DFA2B0}" type="datetimeFigureOut">
               <a:rPr lang="pl-PL" smtClean="0"/>
-              <a:t>16.06.2018</a:t>
+              <a:t>30.10.2020</a:t>
             </a:fld>
             <a:endParaRPr lang="pl-PL"/>
           </a:p>
@@ -2555,7 +2555,7 @@
           <a:p>
             <a:fld id="{864D855C-A84D-D148-8ABE-6F03B1DFA2B0}" type="datetimeFigureOut">
               <a:rPr lang="pl-PL" smtClean="0"/>
-              <a:t>16.06.2018</a:t>
+              <a:t>30.10.2020</a:t>
             </a:fld>
             <a:endParaRPr lang="pl-PL"/>
           </a:p>
@@ -5108,7 +5108,7 @@
             <p:ph idx="1"/>
             <p:extLst>
               <p:ext uri="{D42A27DB-BD31-4B8C-83A1-F6EECF244321}">
-                <p14:modId xmlns:p14="http://schemas.microsoft.com/office/powerpoint/2010/main" val="2216871885"/>
+                <p14:modId xmlns:p14="http://schemas.microsoft.com/office/powerpoint/2010/main" val="2597819258"/>
               </p:ext>
             </p:extLst>
           </p:nvPr>
@@ -5390,7 +5390,7 @@
                           <a:latin typeface="Consolas" panose="020B0609020204030204" pitchFamily="49" charset="0"/>
                           <a:cs typeface="Consolas" panose="020B0609020204030204" pitchFamily="49" charset="0"/>
                         </a:rPr>
-                        <a:t>8</a:t>
+                        <a:t>12</a:t>
                       </a:r>
                     </a:p>
                   </a:txBody>
@@ -5411,7 +5411,19 @@
                           <a:ea typeface="+mn-ea"/>
                           <a:cs typeface="Consolas" panose="020B0609020204030204" pitchFamily="49" charset="0"/>
                         </a:rPr>
-                        <a:t>+/- 1.7e +/- 308 (~15 znaków)</a:t>
+                        <a:t>+/- 1.1e </a:t>
+                      </a:r>
+                      <a:r>
+                        <a:rPr lang="pl-PL" sz="1800" b="0" i="0" kern="1200">
+                          <a:solidFill>
+                            <a:schemeClr val="dk1"/>
+                          </a:solidFill>
+                          <a:effectLst/>
+                          <a:latin typeface="Consolas" panose="020B0609020204030204" pitchFamily="49" charset="0"/>
+                          <a:ea typeface="+mn-ea"/>
+                          <a:cs typeface="Consolas" panose="020B0609020204030204" pitchFamily="49" charset="0"/>
+                        </a:rPr>
+                        <a:t>+/- 4932</a:t>
                       </a:r>
                       <a:endParaRPr lang="pl-PL" baseline="30000" dirty="0">
                         <a:latin typeface="Consolas" panose="020B0609020204030204" pitchFamily="49" charset="0"/>

</xml_diff>